<commit_message>
GenAI - Food Delivery Sentiment Analysis - Added EDA and Ground Truth.
</commit_message>
<xml_diff>
--- a/GenAI-Powered Food Delivery Sentiment Analysis/Project Presentation - Business Applications of GenAI - John Buczkowski.pptx
+++ b/GenAI-Powered Food Delivery Sentiment Analysis/Project Presentation - Business Applications of GenAI - John Buczkowski.pptx
@@ -7,7 +7,7 @@
     <p:sldMasterId id="2147483681" r:id="rId3"/>
   </p:sldMasterIdLst>
   <p:notesMasterIdLst>
-    <p:notesMasterId r:id="rId32"/>
+    <p:notesMasterId r:id="rId34"/>
   </p:notesMasterIdLst>
   <p:sldIdLst>
     <p:sldId id="256" r:id="rId4"/>
@@ -19,54 +19,56 @@
     <p:sldId id="301" r:id="rId10"/>
     <p:sldId id="287" r:id="rId11"/>
     <p:sldId id="303" r:id="rId12"/>
-    <p:sldId id="267" r:id="rId13"/>
-    <p:sldId id="302" r:id="rId14"/>
-    <p:sldId id="260" r:id="rId15"/>
-    <p:sldId id="293" r:id="rId16"/>
-    <p:sldId id="290" r:id="rId17"/>
-    <p:sldId id="294" r:id="rId18"/>
-    <p:sldId id="291" r:id="rId19"/>
-    <p:sldId id="295" r:id="rId20"/>
-    <p:sldId id="292" r:id="rId21"/>
-    <p:sldId id="296" r:id="rId22"/>
-    <p:sldId id="261" r:id="rId23"/>
-    <p:sldId id="297" r:id="rId24"/>
-    <p:sldId id="298" r:id="rId25"/>
-    <p:sldId id="289" r:id="rId26"/>
-    <p:sldId id="262" r:id="rId27"/>
-    <p:sldId id="263" r:id="rId28"/>
-    <p:sldId id="264" r:id="rId29"/>
-    <p:sldId id="265" r:id="rId30"/>
-    <p:sldId id="266" r:id="rId31"/>
+    <p:sldId id="304" r:id="rId13"/>
+    <p:sldId id="267" r:id="rId14"/>
+    <p:sldId id="305" r:id="rId15"/>
+    <p:sldId id="302" r:id="rId16"/>
+    <p:sldId id="260" r:id="rId17"/>
+    <p:sldId id="293" r:id="rId18"/>
+    <p:sldId id="290" r:id="rId19"/>
+    <p:sldId id="294" r:id="rId20"/>
+    <p:sldId id="291" r:id="rId21"/>
+    <p:sldId id="295" r:id="rId22"/>
+    <p:sldId id="292" r:id="rId23"/>
+    <p:sldId id="296" r:id="rId24"/>
+    <p:sldId id="261" r:id="rId25"/>
+    <p:sldId id="297" r:id="rId26"/>
+    <p:sldId id="298" r:id="rId27"/>
+    <p:sldId id="289" r:id="rId28"/>
+    <p:sldId id="262" r:id="rId29"/>
+    <p:sldId id="263" r:id="rId30"/>
+    <p:sldId id="264" r:id="rId31"/>
+    <p:sldId id="265" r:id="rId32"/>
+    <p:sldId id="266" r:id="rId33"/>
   </p:sldIdLst>
   <p:sldSz cx="9144000" cy="5143500" type="screen16x9"/>
   <p:notesSz cx="6858000" cy="9144000"/>
   <p:embeddedFontLst>
     <p:embeddedFont>
       <p:font typeface="Century Gothic" panose="020B0502020202020204" pitchFamily="34" charset="0"/>
-      <p:regular r:id="rId33"/>
-      <p:bold r:id="rId34"/>
-      <p:italic r:id="rId35"/>
-      <p:boldItalic r:id="rId36"/>
+      <p:regular r:id="rId35"/>
+      <p:bold r:id="rId36"/>
+      <p:italic r:id="rId37"/>
+      <p:boldItalic r:id="rId38"/>
     </p:embeddedFont>
     <p:embeddedFont>
       <p:font typeface="Nunito" pitchFamily="2" charset="0"/>
-      <p:regular r:id="rId37"/>
-      <p:bold r:id="rId38"/>
-      <p:italic r:id="rId39"/>
-      <p:boldItalic r:id="rId40"/>
+      <p:regular r:id="rId39"/>
+      <p:bold r:id="rId40"/>
+      <p:italic r:id="rId41"/>
+      <p:boldItalic r:id="rId42"/>
     </p:embeddedFont>
     <p:embeddedFont>
       <p:font typeface="Nunito ExtraBold" pitchFamily="2" charset="0"/>
-      <p:bold r:id="rId41"/>
-      <p:boldItalic r:id="rId42"/>
+      <p:bold r:id="rId43"/>
+      <p:boldItalic r:id="rId44"/>
     </p:embeddedFont>
     <p:embeddedFont>
       <p:font typeface="Nunito SemiBold" pitchFamily="2" charset="0"/>
-      <p:regular r:id="rId43"/>
-      <p:bold r:id="rId44"/>
-      <p:italic r:id="rId45"/>
-      <p:boldItalic r:id="rId46"/>
+      <p:regular r:id="rId45"/>
+      <p:bold r:id="rId46"/>
+      <p:italic r:id="rId47"/>
+      <p:boldItalic r:id="rId48"/>
     </p:embeddedFont>
   </p:embeddedFontLst>
   <p:defaultTextStyle>
@@ -885,6 +887,273 @@
   <p:cSld>
     <p:spTree>
       <p:nvGrpSpPr>
+        <p:cNvPr id="1" name="Shape 159">
+          <a:extLst>
+            <a:ext uri="{FF2B5EF4-FFF2-40B4-BE49-F238E27FC236}">
+              <a16:creationId xmlns:a16="http://schemas.microsoft.com/office/drawing/2014/main" id="{7726BCA9-B956-D9AC-4210-D263F26C66DB}"/>
+            </a:ext>
+          </a:extLst>
+        </p:cNvPr>
+        <p:cNvGrpSpPr/>
+        <p:nvPr/>
+      </p:nvGrpSpPr>
+      <p:grpSpPr>
+        <a:xfrm>
+          <a:off x="0" y="0"/>
+          <a:ext cx="0" cy="0"/>
+          <a:chOff x="0" y="0"/>
+          <a:chExt cx="0" cy="0"/>
+        </a:xfrm>
+      </p:grpSpPr>
+      <p:sp>
+        <p:nvSpPr>
+          <p:cNvPr id="160" name="Google Shape;160;g2cd30dbf4aa_0_262:notes">
+            <a:extLst>
+              <a:ext uri="{FF2B5EF4-FFF2-40B4-BE49-F238E27FC236}">
+                <a16:creationId xmlns:a16="http://schemas.microsoft.com/office/drawing/2014/main" id="{A4236E8E-BAEF-6FA4-0BC6-E49782CD78F4}"/>
+              </a:ext>
+            </a:extLst>
+          </p:cNvPr>
+          <p:cNvSpPr>
+            <a:spLocks noGrp="1" noRot="1" noChangeAspect="1"/>
+          </p:cNvSpPr>
+          <p:nvPr>
+            <p:ph type="sldImg" idx="2"/>
+          </p:nvPr>
+        </p:nvSpPr>
+        <p:spPr>
+          <a:xfrm>
+            <a:off x="381000" y="685800"/>
+            <a:ext cx="6096000" cy="3429000"/>
+          </a:xfrm>
+          <a:custGeom>
+            <a:avLst/>
+            <a:gdLst/>
+            <a:ahLst/>
+            <a:cxnLst/>
+            <a:rect l="l" t="t" r="r" b="b"/>
+            <a:pathLst>
+              <a:path w="120000" h="120000" extrusionOk="0">
+                <a:moveTo>
+                  <a:pt x="0" y="0"/>
+                </a:moveTo>
+                <a:lnTo>
+                  <a:pt x="120000" y="0"/>
+                </a:lnTo>
+                <a:lnTo>
+                  <a:pt x="120000" y="120000"/>
+                </a:lnTo>
+                <a:lnTo>
+                  <a:pt x="0" y="120000"/>
+                </a:lnTo>
+                <a:close/>
+              </a:path>
+            </a:pathLst>
+          </a:custGeom>
+          <a:noFill/>
+          <a:ln w="9525" cap="flat" cmpd="sng">
+            <a:solidFill>
+              <a:srgbClr val="000000"/>
+            </a:solidFill>
+            <a:prstDash val="solid"/>
+            <a:round/>
+            <a:headEnd type="none" w="sm" len="sm"/>
+            <a:tailEnd type="none" w="sm" len="sm"/>
+          </a:ln>
+        </p:spPr>
+      </p:sp>
+      <p:sp>
+        <p:nvSpPr>
+          <p:cNvPr id="161" name="Google Shape;161;g2cd30dbf4aa_0_262:notes">
+            <a:extLst>
+              <a:ext uri="{FF2B5EF4-FFF2-40B4-BE49-F238E27FC236}">
+                <a16:creationId xmlns:a16="http://schemas.microsoft.com/office/drawing/2014/main" id="{F0493C87-025F-0197-CF68-4FBED7B726BB}"/>
+              </a:ext>
+            </a:extLst>
+          </p:cNvPr>
+          <p:cNvSpPr txBox="1">
+            <a:spLocks noGrp="1"/>
+          </p:cNvSpPr>
+          <p:nvPr>
+            <p:ph type="body" idx="1"/>
+          </p:nvPr>
+        </p:nvSpPr>
+        <p:spPr>
+          <a:xfrm>
+            <a:off x="685800" y="4343400"/>
+            <a:ext cx="5486400" cy="4114800"/>
+          </a:xfrm>
+          <a:prstGeom prst="rect">
+            <a:avLst/>
+          </a:prstGeom>
+          <a:noFill/>
+          <a:ln>
+            <a:noFill/>
+          </a:ln>
+        </p:spPr>
+        <p:txBody>
+          <a:bodyPr spcFirstLastPara="1" wrap="square" lIns="91425" tIns="91425" rIns="91425" bIns="91425" anchor="t" anchorCtr="0">
+            <a:noAutofit/>
+          </a:bodyPr>
+          <a:lstStyle/>
+          <a:p>
+            <a:pPr marL="0" lvl="0" indent="0" algn="l" rtl="0">
+              <a:lnSpc>
+                <a:spcPct val="100000"/>
+              </a:lnSpc>
+              <a:spcBef>
+                <a:spcPts val="0"/>
+              </a:spcBef>
+              <a:spcAft>
+                <a:spcPts val="0"/>
+              </a:spcAft>
+              <a:buSzPts val="1100"/>
+              <a:buNone/>
+            </a:pPr>
+            <a:endParaRPr/>
+          </a:p>
+        </p:txBody>
+      </p:sp>
+    </p:spTree>
+    <p:extLst>
+      <p:ext uri="{BB962C8B-B14F-4D97-AF65-F5344CB8AC3E}">
+        <p14:creationId xmlns:p14="http://schemas.microsoft.com/office/powerpoint/2010/main" val="3034927284"/>
+      </p:ext>
+    </p:extLst>
+  </p:cSld>
+  <p:clrMapOvr>
+    <a:masterClrMapping/>
+  </p:clrMapOvr>
+</p:notes>
+</file>
+
+<file path=ppt/notesSlides/notesSlide11.xml><?xml version="1.0" encoding="utf-8"?>
+<p:notes xmlns:a="http://schemas.openxmlformats.org/drawingml/2006/main" xmlns:r="http://schemas.openxmlformats.org/officeDocument/2006/relationships" xmlns:p="http://schemas.openxmlformats.org/presentationml/2006/main" showMasterSp="0" showMasterPhAnim="0">
+  <p:cSld>
+    <p:spTree>
+      <p:nvGrpSpPr>
+        <p:cNvPr id="1" name="Shape 171"/>
+        <p:cNvGrpSpPr/>
+        <p:nvPr/>
+      </p:nvGrpSpPr>
+      <p:grpSpPr>
+        <a:xfrm>
+          <a:off x="0" y="0"/>
+          <a:ext cx="0" cy="0"/>
+          <a:chOff x="0" y="0"/>
+          <a:chExt cx="0" cy="0"/>
+        </a:xfrm>
+      </p:grpSpPr>
+      <p:sp>
+        <p:nvSpPr>
+          <p:cNvPr id="172" name="Google Shape;172;g2cd30dbf4aa_0_267:notes"/>
+          <p:cNvSpPr>
+            <a:spLocks noGrp="1" noRot="1" noChangeAspect="1"/>
+          </p:cNvSpPr>
+          <p:nvPr>
+            <p:ph type="sldImg" idx="2"/>
+          </p:nvPr>
+        </p:nvSpPr>
+        <p:spPr>
+          <a:xfrm>
+            <a:off x="381000" y="685800"/>
+            <a:ext cx="6096000" cy="3429000"/>
+          </a:xfrm>
+          <a:custGeom>
+            <a:avLst/>
+            <a:gdLst/>
+            <a:ahLst/>
+            <a:cxnLst/>
+            <a:rect l="l" t="t" r="r" b="b"/>
+            <a:pathLst>
+              <a:path w="120000" h="120000" extrusionOk="0">
+                <a:moveTo>
+                  <a:pt x="0" y="0"/>
+                </a:moveTo>
+                <a:lnTo>
+                  <a:pt x="120000" y="0"/>
+                </a:lnTo>
+                <a:lnTo>
+                  <a:pt x="120000" y="120000"/>
+                </a:lnTo>
+                <a:lnTo>
+                  <a:pt x="0" y="120000"/>
+                </a:lnTo>
+                <a:close/>
+              </a:path>
+            </a:pathLst>
+          </a:custGeom>
+          <a:noFill/>
+          <a:ln w="9525" cap="flat" cmpd="sng">
+            <a:solidFill>
+              <a:srgbClr val="000000"/>
+            </a:solidFill>
+            <a:prstDash val="solid"/>
+            <a:round/>
+            <a:headEnd type="none" w="sm" len="sm"/>
+            <a:tailEnd type="none" w="sm" len="sm"/>
+          </a:ln>
+        </p:spPr>
+      </p:sp>
+      <p:sp>
+        <p:nvSpPr>
+          <p:cNvPr id="173" name="Google Shape;173;g2cd30dbf4aa_0_267:notes"/>
+          <p:cNvSpPr txBox="1">
+            <a:spLocks noGrp="1"/>
+          </p:cNvSpPr>
+          <p:nvPr>
+            <p:ph type="body" idx="1"/>
+          </p:nvPr>
+        </p:nvSpPr>
+        <p:spPr>
+          <a:xfrm>
+            <a:off x="685800" y="4343400"/>
+            <a:ext cx="5486400" cy="4114800"/>
+          </a:xfrm>
+          <a:prstGeom prst="rect">
+            <a:avLst/>
+          </a:prstGeom>
+          <a:noFill/>
+          <a:ln>
+            <a:noFill/>
+          </a:ln>
+        </p:spPr>
+        <p:txBody>
+          <a:bodyPr spcFirstLastPara="1" wrap="square" lIns="91425" tIns="91425" rIns="91425" bIns="91425" anchor="t" anchorCtr="0">
+            <a:noAutofit/>
+          </a:bodyPr>
+          <a:lstStyle/>
+          <a:p>
+            <a:pPr marL="0" lvl="0" indent="0" algn="l" rtl="0">
+              <a:lnSpc>
+                <a:spcPct val="100000"/>
+              </a:lnSpc>
+              <a:spcBef>
+                <a:spcPts val="0"/>
+              </a:spcBef>
+              <a:spcAft>
+                <a:spcPts val="0"/>
+              </a:spcAft>
+              <a:buSzPts val="1100"/>
+              <a:buNone/>
+            </a:pPr>
+            <a:endParaRPr/>
+          </a:p>
+        </p:txBody>
+      </p:sp>
+    </p:spTree>
+  </p:cSld>
+  <p:clrMapOvr>
+    <a:masterClrMapping/>
+  </p:clrMapOvr>
+</p:notes>
+</file>
+
+<file path=ppt/notesSlides/notesSlide12.xml><?xml version="1.0" encoding="utf-8"?>
+<p:notes xmlns:a="http://schemas.openxmlformats.org/drawingml/2006/main" xmlns:r="http://schemas.openxmlformats.org/officeDocument/2006/relationships" xmlns:p="http://schemas.openxmlformats.org/presentationml/2006/main" showMasterSp="0" showMasterPhAnim="0">
+  <p:cSld>
+    <p:spTree>
+      <p:nvGrpSpPr>
         <p:cNvPr id="1" name="Shape 171">
           <a:extLst>
             <a:ext uri="{FF2B5EF4-FFF2-40B4-BE49-F238E27FC236}">
@@ -1025,7 +1294,7 @@
 </p:notes>
 </file>
 
-<file path=ppt/notesSlides/notesSlide11.xml><?xml version="1.0" encoding="utf-8"?>
+<file path=ppt/notesSlides/notesSlide13.xml><?xml version="1.0" encoding="utf-8"?>
 <p:notes xmlns:a="http://schemas.openxmlformats.org/drawingml/2006/main" xmlns:r="http://schemas.openxmlformats.org/officeDocument/2006/relationships" xmlns:p="http://schemas.openxmlformats.org/presentationml/2006/main" showMasterSp="0" showMasterPhAnim="0">
   <p:cSld>
     <p:spTree>
@@ -1170,7 +1439,7 @@
 </p:notes>
 </file>
 
-<file path=ppt/notesSlides/notesSlide12.xml><?xml version="1.0" encoding="utf-8"?>
+<file path=ppt/notesSlides/notesSlide14.xml><?xml version="1.0" encoding="utf-8"?>
 <p:notes xmlns:a="http://schemas.openxmlformats.org/drawingml/2006/main" xmlns:r="http://schemas.openxmlformats.org/officeDocument/2006/relationships" xmlns:p="http://schemas.openxmlformats.org/presentationml/2006/main" showMasterSp="0" showMasterPhAnim="0">
   <p:cSld>
     <p:spTree>
@@ -1315,7 +1584,7 @@
 </p:notes>
 </file>
 
-<file path=ppt/notesSlides/notesSlide13.xml><?xml version="1.0" encoding="utf-8"?>
+<file path=ppt/notesSlides/notesSlide15.xml><?xml version="1.0" encoding="utf-8"?>
 <p:notes xmlns:a="http://schemas.openxmlformats.org/drawingml/2006/main" xmlns:r="http://schemas.openxmlformats.org/officeDocument/2006/relationships" xmlns:p="http://schemas.openxmlformats.org/presentationml/2006/main" showMasterSp="0" showMasterPhAnim="0">
   <p:cSld>
     <p:spTree>
@@ -1460,7 +1729,7 @@
 </p:notes>
 </file>
 
-<file path=ppt/notesSlides/notesSlide14.xml><?xml version="1.0" encoding="utf-8"?>
+<file path=ppt/notesSlides/notesSlide16.xml><?xml version="1.0" encoding="utf-8"?>
 <p:notes xmlns:a="http://schemas.openxmlformats.org/drawingml/2006/main" xmlns:r="http://schemas.openxmlformats.org/officeDocument/2006/relationships" xmlns:p="http://schemas.openxmlformats.org/presentationml/2006/main" showMasterSp="0" showMasterPhAnim="0">
   <p:cSld>
     <p:spTree>
@@ -1605,7 +1874,7 @@
 </p:notes>
 </file>
 
-<file path=ppt/notesSlides/notesSlide15.xml><?xml version="1.0" encoding="utf-8"?>
+<file path=ppt/notesSlides/notesSlide17.xml><?xml version="1.0" encoding="utf-8"?>
 <p:notes xmlns:a="http://schemas.openxmlformats.org/drawingml/2006/main" xmlns:r="http://schemas.openxmlformats.org/officeDocument/2006/relationships" xmlns:p="http://schemas.openxmlformats.org/presentationml/2006/main" showMasterSp="0" showMasterPhAnim="0">
   <p:cSld>
     <p:spTree>
@@ -1750,7 +2019,7 @@
 </p:notes>
 </file>
 
-<file path=ppt/notesSlides/notesSlide16.xml><?xml version="1.0" encoding="utf-8"?>
+<file path=ppt/notesSlides/notesSlide18.xml><?xml version="1.0" encoding="utf-8"?>
 <p:notes xmlns:a="http://schemas.openxmlformats.org/drawingml/2006/main" xmlns:r="http://schemas.openxmlformats.org/officeDocument/2006/relationships" xmlns:p="http://schemas.openxmlformats.org/presentationml/2006/main" showMasterSp="0" showMasterPhAnim="0">
   <p:cSld>
     <p:spTree>
@@ -1895,7 +2164,7 @@
 </p:notes>
 </file>
 
-<file path=ppt/notesSlides/notesSlide17.xml><?xml version="1.0" encoding="utf-8"?>
+<file path=ppt/notesSlides/notesSlide19.xml><?xml version="1.0" encoding="utf-8"?>
 <p:notes xmlns:a="http://schemas.openxmlformats.org/drawingml/2006/main" xmlns:r="http://schemas.openxmlformats.org/officeDocument/2006/relationships" xmlns:p="http://schemas.openxmlformats.org/presentationml/2006/main" showMasterSp="0" showMasterPhAnim="0">
   <p:cSld>
     <p:spTree>
@@ -2017,7 +2286,129 @@
 </p:notes>
 </file>
 
-<file path=ppt/notesSlides/notesSlide18.xml><?xml version="1.0" encoding="utf-8"?>
+<file path=ppt/notesSlides/notesSlide2.xml><?xml version="1.0" encoding="utf-8"?>
+<p:notes xmlns:a="http://schemas.openxmlformats.org/drawingml/2006/main" xmlns:r="http://schemas.openxmlformats.org/officeDocument/2006/relationships" xmlns:p="http://schemas.openxmlformats.org/presentationml/2006/main" showMasterSp="0" showMasterPhAnim="0">
+  <p:cSld>
+    <p:spTree>
+      <p:nvGrpSpPr>
+        <p:cNvPr id="1" name="Shape 153"/>
+        <p:cNvGrpSpPr/>
+        <p:nvPr/>
+      </p:nvGrpSpPr>
+      <p:grpSpPr>
+        <a:xfrm>
+          <a:off x="0" y="0"/>
+          <a:ext cx="0" cy="0"/>
+          <a:chOff x="0" y="0"/>
+          <a:chExt cx="0" cy="0"/>
+        </a:xfrm>
+      </p:grpSpPr>
+      <p:sp>
+        <p:nvSpPr>
+          <p:cNvPr id="154" name="Google Shape;154;g2cd30dbf4aa_0_257:notes"/>
+          <p:cNvSpPr>
+            <a:spLocks noGrp="1" noRot="1" noChangeAspect="1"/>
+          </p:cNvSpPr>
+          <p:nvPr>
+            <p:ph type="sldImg" idx="2"/>
+          </p:nvPr>
+        </p:nvSpPr>
+        <p:spPr>
+          <a:xfrm>
+            <a:off x="381300" y="685800"/>
+            <a:ext cx="6096000" cy="3429000"/>
+          </a:xfrm>
+          <a:custGeom>
+            <a:avLst/>
+            <a:gdLst/>
+            <a:ahLst/>
+            <a:cxnLst/>
+            <a:rect l="l" t="t" r="r" b="b"/>
+            <a:pathLst>
+              <a:path w="120000" h="120000" extrusionOk="0">
+                <a:moveTo>
+                  <a:pt x="0" y="0"/>
+                </a:moveTo>
+                <a:lnTo>
+                  <a:pt x="120000" y="0"/>
+                </a:lnTo>
+                <a:lnTo>
+                  <a:pt x="120000" y="120000"/>
+                </a:lnTo>
+                <a:lnTo>
+                  <a:pt x="0" y="120000"/>
+                </a:lnTo>
+                <a:close/>
+              </a:path>
+            </a:pathLst>
+          </a:custGeom>
+          <a:noFill/>
+          <a:ln w="9525" cap="flat" cmpd="sng">
+            <a:solidFill>
+              <a:srgbClr val="000000"/>
+            </a:solidFill>
+            <a:prstDash val="solid"/>
+            <a:round/>
+            <a:headEnd type="none" w="sm" len="sm"/>
+            <a:tailEnd type="none" w="sm" len="sm"/>
+          </a:ln>
+        </p:spPr>
+      </p:sp>
+      <p:sp>
+        <p:nvSpPr>
+          <p:cNvPr id="155" name="Google Shape;155;g2cd30dbf4aa_0_257:notes"/>
+          <p:cNvSpPr txBox="1">
+            <a:spLocks noGrp="1"/>
+          </p:cNvSpPr>
+          <p:nvPr>
+            <p:ph type="body" idx="1"/>
+          </p:nvPr>
+        </p:nvSpPr>
+        <p:spPr>
+          <a:xfrm>
+            <a:off x="685800" y="4343400"/>
+            <a:ext cx="5486400" cy="4114800"/>
+          </a:xfrm>
+          <a:prstGeom prst="rect">
+            <a:avLst/>
+          </a:prstGeom>
+          <a:noFill/>
+          <a:ln>
+            <a:noFill/>
+          </a:ln>
+        </p:spPr>
+        <p:txBody>
+          <a:bodyPr spcFirstLastPara="1" wrap="square" lIns="91425" tIns="91425" rIns="91425" bIns="91425" anchor="t" anchorCtr="0">
+            <a:noAutofit/>
+          </a:bodyPr>
+          <a:lstStyle/>
+          <a:p>
+            <a:pPr marL="0" lvl="0" indent="0" algn="l" rtl="0">
+              <a:lnSpc>
+                <a:spcPct val="100000"/>
+              </a:lnSpc>
+              <a:spcBef>
+                <a:spcPts val="0"/>
+              </a:spcBef>
+              <a:spcAft>
+                <a:spcPts val="0"/>
+              </a:spcAft>
+              <a:buSzPts val="1100"/>
+              <a:buNone/>
+            </a:pPr>
+            <a:endParaRPr/>
+          </a:p>
+        </p:txBody>
+      </p:sp>
+    </p:spTree>
+  </p:cSld>
+  <p:clrMapOvr>
+    <a:masterClrMapping/>
+  </p:clrMapOvr>
+</p:notes>
+</file>
+
+<file path=ppt/notesSlides/notesSlide20.xml><?xml version="1.0" encoding="utf-8"?>
 <p:notes xmlns:a="http://schemas.openxmlformats.org/drawingml/2006/main" xmlns:r="http://schemas.openxmlformats.org/officeDocument/2006/relationships" xmlns:p="http://schemas.openxmlformats.org/presentationml/2006/main" showMasterSp="0" showMasterPhAnim="0">
   <p:cSld>
     <p:spTree>
@@ -2162,7 +2553,7 @@
 </p:notes>
 </file>
 
-<file path=ppt/notesSlides/notesSlide19.xml><?xml version="1.0" encoding="utf-8"?>
+<file path=ppt/notesSlides/notesSlide21.xml><?xml version="1.0" encoding="utf-8"?>
 <p:notes xmlns:a="http://schemas.openxmlformats.org/drawingml/2006/main" xmlns:r="http://schemas.openxmlformats.org/officeDocument/2006/relationships" xmlns:p="http://schemas.openxmlformats.org/presentationml/2006/main" showMasterSp="0" showMasterPhAnim="0">
   <p:cSld>
     <p:spTree>
@@ -2307,129 +2698,7 @@
 </p:notes>
 </file>
 
-<file path=ppt/notesSlides/notesSlide2.xml><?xml version="1.0" encoding="utf-8"?>
-<p:notes xmlns:a="http://schemas.openxmlformats.org/drawingml/2006/main" xmlns:r="http://schemas.openxmlformats.org/officeDocument/2006/relationships" xmlns:p="http://schemas.openxmlformats.org/presentationml/2006/main" showMasterSp="0" showMasterPhAnim="0">
-  <p:cSld>
-    <p:spTree>
-      <p:nvGrpSpPr>
-        <p:cNvPr id="1" name="Shape 153"/>
-        <p:cNvGrpSpPr/>
-        <p:nvPr/>
-      </p:nvGrpSpPr>
-      <p:grpSpPr>
-        <a:xfrm>
-          <a:off x="0" y="0"/>
-          <a:ext cx="0" cy="0"/>
-          <a:chOff x="0" y="0"/>
-          <a:chExt cx="0" cy="0"/>
-        </a:xfrm>
-      </p:grpSpPr>
-      <p:sp>
-        <p:nvSpPr>
-          <p:cNvPr id="154" name="Google Shape;154;g2cd30dbf4aa_0_257:notes"/>
-          <p:cNvSpPr>
-            <a:spLocks noGrp="1" noRot="1" noChangeAspect="1"/>
-          </p:cNvSpPr>
-          <p:nvPr>
-            <p:ph type="sldImg" idx="2"/>
-          </p:nvPr>
-        </p:nvSpPr>
-        <p:spPr>
-          <a:xfrm>
-            <a:off x="381300" y="685800"/>
-            <a:ext cx="6096000" cy="3429000"/>
-          </a:xfrm>
-          <a:custGeom>
-            <a:avLst/>
-            <a:gdLst/>
-            <a:ahLst/>
-            <a:cxnLst/>
-            <a:rect l="l" t="t" r="r" b="b"/>
-            <a:pathLst>
-              <a:path w="120000" h="120000" extrusionOk="0">
-                <a:moveTo>
-                  <a:pt x="0" y="0"/>
-                </a:moveTo>
-                <a:lnTo>
-                  <a:pt x="120000" y="0"/>
-                </a:lnTo>
-                <a:lnTo>
-                  <a:pt x="120000" y="120000"/>
-                </a:lnTo>
-                <a:lnTo>
-                  <a:pt x="0" y="120000"/>
-                </a:lnTo>
-                <a:close/>
-              </a:path>
-            </a:pathLst>
-          </a:custGeom>
-          <a:noFill/>
-          <a:ln w="9525" cap="flat" cmpd="sng">
-            <a:solidFill>
-              <a:srgbClr val="000000"/>
-            </a:solidFill>
-            <a:prstDash val="solid"/>
-            <a:round/>
-            <a:headEnd type="none" w="sm" len="sm"/>
-            <a:tailEnd type="none" w="sm" len="sm"/>
-          </a:ln>
-        </p:spPr>
-      </p:sp>
-      <p:sp>
-        <p:nvSpPr>
-          <p:cNvPr id="155" name="Google Shape;155;g2cd30dbf4aa_0_257:notes"/>
-          <p:cNvSpPr txBox="1">
-            <a:spLocks noGrp="1"/>
-          </p:cNvSpPr>
-          <p:nvPr>
-            <p:ph type="body" idx="1"/>
-          </p:nvPr>
-        </p:nvSpPr>
-        <p:spPr>
-          <a:xfrm>
-            <a:off x="685800" y="4343400"/>
-            <a:ext cx="5486400" cy="4114800"/>
-          </a:xfrm>
-          <a:prstGeom prst="rect">
-            <a:avLst/>
-          </a:prstGeom>
-          <a:noFill/>
-          <a:ln>
-            <a:noFill/>
-          </a:ln>
-        </p:spPr>
-        <p:txBody>
-          <a:bodyPr spcFirstLastPara="1" wrap="square" lIns="91425" tIns="91425" rIns="91425" bIns="91425" anchor="t" anchorCtr="0">
-            <a:noAutofit/>
-          </a:bodyPr>
-          <a:lstStyle/>
-          <a:p>
-            <a:pPr marL="0" lvl="0" indent="0" algn="l" rtl="0">
-              <a:lnSpc>
-                <a:spcPct val="100000"/>
-              </a:lnSpc>
-              <a:spcBef>
-                <a:spcPts val="0"/>
-              </a:spcBef>
-              <a:spcAft>
-                <a:spcPts val="0"/>
-              </a:spcAft>
-              <a:buSzPts val="1100"/>
-              <a:buNone/>
-            </a:pPr>
-            <a:endParaRPr/>
-          </a:p>
-        </p:txBody>
-      </p:sp>
-    </p:spTree>
-  </p:cSld>
-  <p:clrMapOvr>
-    <a:masterClrMapping/>
-  </p:clrMapOvr>
-</p:notes>
-</file>
-
-<file path=ppt/notesSlides/notesSlide20.xml><?xml version="1.0" encoding="utf-8"?>
+<file path=ppt/notesSlides/notesSlide22.xml><?xml version="1.0" encoding="utf-8"?>
 <p:notes xmlns:a="http://schemas.openxmlformats.org/drawingml/2006/main" xmlns:r="http://schemas.openxmlformats.org/officeDocument/2006/relationships" xmlns:p="http://schemas.openxmlformats.org/presentationml/2006/main" showMasterSp="0" showMasterPhAnim="0">
   <p:cSld>
     <p:spTree>
@@ -2574,7 +2843,7 @@
 </p:notes>
 </file>
 
-<file path=ppt/notesSlides/notesSlide21.xml><?xml version="1.0" encoding="utf-8"?>
+<file path=ppt/notesSlides/notesSlide23.xml><?xml version="1.0" encoding="utf-8"?>
 <p:notes xmlns:a="http://schemas.openxmlformats.org/drawingml/2006/main" xmlns:r="http://schemas.openxmlformats.org/officeDocument/2006/relationships" xmlns:p="http://schemas.openxmlformats.org/presentationml/2006/main" showMasterSp="0" showMasterPhAnim="0">
   <p:cSld>
     <p:spTree>
@@ -2696,7 +2965,7 @@
 </p:notes>
 </file>
 
-<file path=ppt/notesSlides/notesSlide22.xml><?xml version="1.0" encoding="utf-8"?>
+<file path=ppt/notesSlides/notesSlide24.xml><?xml version="1.0" encoding="utf-8"?>
 <p:notes xmlns:a="http://schemas.openxmlformats.org/drawingml/2006/main" xmlns:r="http://schemas.openxmlformats.org/officeDocument/2006/relationships" xmlns:p="http://schemas.openxmlformats.org/presentationml/2006/main" showMasterSp="0" showMasterPhAnim="0">
   <p:cSld>
     <p:spTree>
@@ -2818,7 +3087,7 @@
 </p:notes>
 </file>
 
-<file path=ppt/notesSlides/notesSlide23.xml><?xml version="1.0" encoding="utf-8"?>
+<file path=ppt/notesSlides/notesSlide25.xml><?xml version="1.0" encoding="utf-8"?>
 <p:notes xmlns:a="http://schemas.openxmlformats.org/drawingml/2006/main" xmlns:r="http://schemas.openxmlformats.org/officeDocument/2006/relationships" xmlns:p="http://schemas.openxmlformats.org/presentationml/2006/main" showMasterSp="0" showMasterPhAnim="0">
   <p:cSld>
     <p:spTree>
@@ -2940,7 +3209,7 @@
 </p:notes>
 </file>
 
-<file path=ppt/notesSlides/notesSlide24.xml><?xml version="1.0" encoding="utf-8"?>
+<file path=ppt/notesSlides/notesSlide26.xml><?xml version="1.0" encoding="utf-8"?>
 <p:notes xmlns:a="http://schemas.openxmlformats.org/drawingml/2006/main" xmlns:r="http://schemas.openxmlformats.org/officeDocument/2006/relationships" xmlns:p="http://schemas.openxmlformats.org/presentationml/2006/main" showMasterSp="0" showMasterPhAnim="0">
   <p:cSld>
     <p:spTree>
@@ -3062,7 +3331,7 @@
 </p:notes>
 </file>
 
-<file path=ppt/notesSlides/notesSlide25.xml><?xml version="1.0" encoding="utf-8"?>
+<file path=ppt/notesSlides/notesSlide27.xml><?xml version="1.0" encoding="utf-8"?>
 <p:notes xmlns:a="http://schemas.openxmlformats.org/drawingml/2006/main" xmlns:r="http://schemas.openxmlformats.org/officeDocument/2006/relationships" xmlns:p="http://schemas.openxmlformats.org/presentationml/2006/main" showMasterSp="0" showMasterPhAnim="0">
   <p:cSld>
     <p:spTree>
@@ -3232,7 +3501,7 @@
                 <a:cs typeface="Calibri"/>
                 <a:sym typeface="Calibri"/>
               </a:rPr>
-              <a:t>28</a:t>
+              <a:t>30</a:t>
             </a:fld>
             <a:endParaRPr sz="1200" b="0" i="0" u="none" strike="noStrike" cap="none">
               <a:solidFill>
@@ -3863,6 +4132,151 @@
   <p:cSld>
     <p:spTree>
       <p:nvGrpSpPr>
+        <p:cNvPr id="1" name="Shape 184">
+          <a:extLst>
+            <a:ext uri="{FF2B5EF4-FFF2-40B4-BE49-F238E27FC236}">
+              <a16:creationId xmlns:a16="http://schemas.microsoft.com/office/drawing/2014/main" id="{0D0FF4E9-C808-31E5-36AE-61C52A55462B}"/>
+            </a:ext>
+          </a:extLst>
+        </p:cNvPr>
+        <p:cNvGrpSpPr/>
+        <p:nvPr/>
+      </p:nvGrpSpPr>
+      <p:grpSpPr>
+        <a:xfrm>
+          <a:off x="0" y="0"/>
+          <a:ext cx="0" cy="0"/>
+          <a:chOff x="0" y="0"/>
+          <a:chExt cx="0" cy="0"/>
+        </a:xfrm>
+      </p:grpSpPr>
+      <p:sp>
+        <p:nvSpPr>
+          <p:cNvPr id="185" name="Google Shape;185;p7:notes">
+            <a:extLst>
+              <a:ext uri="{FF2B5EF4-FFF2-40B4-BE49-F238E27FC236}">
+                <a16:creationId xmlns:a16="http://schemas.microsoft.com/office/drawing/2014/main" id="{7CDCD695-627E-0FA1-7926-4664A9773C93}"/>
+              </a:ext>
+            </a:extLst>
+          </p:cNvPr>
+          <p:cNvSpPr>
+            <a:spLocks noGrp="1" noRot="1" noChangeAspect="1"/>
+          </p:cNvSpPr>
+          <p:nvPr>
+            <p:ph type="sldImg" idx="2"/>
+          </p:nvPr>
+        </p:nvSpPr>
+        <p:spPr>
+          <a:xfrm>
+            <a:off x="381000" y="685800"/>
+            <a:ext cx="6096000" cy="3429000"/>
+          </a:xfrm>
+          <a:custGeom>
+            <a:avLst/>
+            <a:gdLst/>
+            <a:ahLst/>
+            <a:cxnLst/>
+            <a:rect l="l" t="t" r="r" b="b"/>
+            <a:pathLst>
+              <a:path w="120000" h="120000" extrusionOk="0">
+                <a:moveTo>
+                  <a:pt x="0" y="0"/>
+                </a:moveTo>
+                <a:lnTo>
+                  <a:pt x="120000" y="0"/>
+                </a:lnTo>
+                <a:lnTo>
+                  <a:pt x="120000" y="120000"/>
+                </a:lnTo>
+                <a:lnTo>
+                  <a:pt x="0" y="120000"/>
+                </a:lnTo>
+                <a:close/>
+              </a:path>
+            </a:pathLst>
+          </a:custGeom>
+          <a:noFill/>
+          <a:ln w="9525" cap="flat" cmpd="sng">
+            <a:solidFill>
+              <a:srgbClr val="000000"/>
+            </a:solidFill>
+            <a:prstDash val="solid"/>
+            <a:round/>
+            <a:headEnd type="none" w="sm" len="sm"/>
+            <a:tailEnd type="none" w="sm" len="sm"/>
+          </a:ln>
+        </p:spPr>
+      </p:sp>
+      <p:sp>
+        <p:nvSpPr>
+          <p:cNvPr id="186" name="Google Shape;186;p7:notes">
+            <a:extLst>
+              <a:ext uri="{FF2B5EF4-FFF2-40B4-BE49-F238E27FC236}">
+                <a16:creationId xmlns:a16="http://schemas.microsoft.com/office/drawing/2014/main" id="{62A7084B-9BF6-5287-2C0B-25C9B46E28E7}"/>
+              </a:ext>
+            </a:extLst>
+          </p:cNvPr>
+          <p:cNvSpPr txBox="1">
+            <a:spLocks noGrp="1"/>
+          </p:cNvSpPr>
+          <p:nvPr>
+            <p:ph type="body" idx="1"/>
+          </p:nvPr>
+        </p:nvSpPr>
+        <p:spPr>
+          <a:xfrm>
+            <a:off x="685800" y="4343400"/>
+            <a:ext cx="5486400" cy="4114800"/>
+          </a:xfrm>
+          <a:prstGeom prst="rect">
+            <a:avLst/>
+          </a:prstGeom>
+          <a:noFill/>
+          <a:ln>
+            <a:noFill/>
+          </a:ln>
+        </p:spPr>
+        <p:txBody>
+          <a:bodyPr spcFirstLastPara="1" wrap="square" lIns="91425" tIns="91425" rIns="91425" bIns="91425" anchor="t" anchorCtr="0">
+            <a:noAutofit/>
+          </a:bodyPr>
+          <a:lstStyle/>
+          <a:p>
+            <a:pPr marL="0" lvl="0" indent="0" algn="l" rtl="0">
+              <a:lnSpc>
+                <a:spcPct val="100000"/>
+              </a:lnSpc>
+              <a:spcBef>
+                <a:spcPts val="0"/>
+              </a:spcBef>
+              <a:spcAft>
+                <a:spcPts val="0"/>
+              </a:spcAft>
+              <a:buSzPts val="1100"/>
+              <a:buNone/>
+            </a:pPr>
+            <a:endParaRPr/>
+          </a:p>
+        </p:txBody>
+      </p:sp>
+    </p:spTree>
+    <p:extLst>
+      <p:ext uri="{BB962C8B-B14F-4D97-AF65-F5344CB8AC3E}">
+        <p14:creationId xmlns:p14="http://schemas.microsoft.com/office/powerpoint/2010/main" val="572127357"/>
+      </p:ext>
+    </p:extLst>
+  </p:cSld>
+  <p:clrMapOvr>
+    <a:masterClrMapping/>
+  </p:clrMapOvr>
+</p:notes>
+</file>
+
+<file path=ppt/notesSlides/notesSlide8.xml><?xml version="1.0" encoding="utf-8"?>
+<p:notes xmlns:a="http://schemas.openxmlformats.org/drawingml/2006/main" xmlns:r="http://schemas.openxmlformats.org/officeDocument/2006/relationships" xmlns:p="http://schemas.openxmlformats.org/presentationml/2006/main" showMasterSp="0" showMasterPhAnim="0">
+  <p:cSld>
+    <p:spTree>
+      <p:nvGrpSpPr>
         <p:cNvPr id="1" name="Shape 159">
           <a:extLst>
             <a:ext uri="{FF2B5EF4-FFF2-40B4-BE49-F238E27FC236}">
@@ -4003,7 +4417,7 @@
 </p:notes>
 </file>
 
-<file path=ppt/notesSlides/notesSlide8.xml><?xml version="1.0" encoding="utf-8"?>
+<file path=ppt/notesSlides/notesSlide9.xml><?xml version="1.0" encoding="utf-8"?>
 <p:notes xmlns:a="http://schemas.openxmlformats.org/drawingml/2006/main" xmlns:r="http://schemas.openxmlformats.org/officeDocument/2006/relationships" xmlns:p="http://schemas.openxmlformats.org/presentationml/2006/main" showMasterSp="0" showMasterPhAnim="0">
   <p:cSld>
     <p:spTree>
@@ -4011,7 +4425,7 @@
         <p:cNvPr id="1" name="Shape 159">
           <a:extLst>
             <a:ext uri="{FF2B5EF4-FFF2-40B4-BE49-F238E27FC236}">
-              <a16:creationId xmlns:a16="http://schemas.microsoft.com/office/drawing/2014/main" id="{7726BCA9-B956-D9AC-4210-D263F26C66DB}"/>
+              <a16:creationId xmlns:a16="http://schemas.microsoft.com/office/drawing/2014/main" id="{23E6E1BE-294C-EB53-FBBD-A03A26598780}"/>
             </a:ext>
           </a:extLst>
         </p:cNvPr>
@@ -4031,7 +4445,7 @@
           <p:cNvPr id="160" name="Google Shape;160;g2cd30dbf4aa_0_262:notes">
             <a:extLst>
               <a:ext uri="{FF2B5EF4-FFF2-40B4-BE49-F238E27FC236}">
-                <a16:creationId xmlns:a16="http://schemas.microsoft.com/office/drawing/2014/main" id="{A4236E8E-BAEF-6FA4-0BC6-E49782CD78F4}"/>
+                <a16:creationId xmlns:a16="http://schemas.microsoft.com/office/drawing/2014/main" id="{DB487623-5569-DE3E-5F80-A25259DA13E2}"/>
               </a:ext>
             </a:extLst>
           </p:cNvPr>
@@ -4088,7 +4502,7 @@
           <p:cNvPr id="161" name="Google Shape;161;g2cd30dbf4aa_0_262:notes">
             <a:extLst>
               <a:ext uri="{FF2B5EF4-FFF2-40B4-BE49-F238E27FC236}">
-                <a16:creationId xmlns:a16="http://schemas.microsoft.com/office/drawing/2014/main" id="{F0493C87-025F-0197-CF68-4FBED7B726BB}"/>
+                <a16:creationId xmlns:a16="http://schemas.microsoft.com/office/drawing/2014/main" id="{49966BE5-8A02-4288-F542-BA962C455BF9}"/>
               </a:ext>
             </a:extLst>
           </p:cNvPr>
@@ -4138,131 +4552,9 @@
     </p:spTree>
     <p:extLst>
       <p:ext uri="{BB962C8B-B14F-4D97-AF65-F5344CB8AC3E}">
-        <p14:creationId xmlns:p14="http://schemas.microsoft.com/office/powerpoint/2010/main" val="3034927284"/>
+        <p14:creationId xmlns:p14="http://schemas.microsoft.com/office/powerpoint/2010/main" val="392626638"/>
       </p:ext>
     </p:extLst>
-  </p:cSld>
-  <p:clrMapOvr>
-    <a:masterClrMapping/>
-  </p:clrMapOvr>
-</p:notes>
-</file>
-
-<file path=ppt/notesSlides/notesSlide9.xml><?xml version="1.0" encoding="utf-8"?>
-<p:notes xmlns:a="http://schemas.openxmlformats.org/drawingml/2006/main" xmlns:r="http://schemas.openxmlformats.org/officeDocument/2006/relationships" xmlns:p="http://schemas.openxmlformats.org/presentationml/2006/main" showMasterSp="0" showMasterPhAnim="0">
-  <p:cSld>
-    <p:spTree>
-      <p:nvGrpSpPr>
-        <p:cNvPr id="1" name="Shape 171"/>
-        <p:cNvGrpSpPr/>
-        <p:nvPr/>
-      </p:nvGrpSpPr>
-      <p:grpSpPr>
-        <a:xfrm>
-          <a:off x="0" y="0"/>
-          <a:ext cx="0" cy="0"/>
-          <a:chOff x="0" y="0"/>
-          <a:chExt cx="0" cy="0"/>
-        </a:xfrm>
-      </p:grpSpPr>
-      <p:sp>
-        <p:nvSpPr>
-          <p:cNvPr id="172" name="Google Shape;172;g2cd30dbf4aa_0_267:notes"/>
-          <p:cNvSpPr>
-            <a:spLocks noGrp="1" noRot="1" noChangeAspect="1"/>
-          </p:cNvSpPr>
-          <p:nvPr>
-            <p:ph type="sldImg" idx="2"/>
-          </p:nvPr>
-        </p:nvSpPr>
-        <p:spPr>
-          <a:xfrm>
-            <a:off x="381000" y="685800"/>
-            <a:ext cx="6096000" cy="3429000"/>
-          </a:xfrm>
-          <a:custGeom>
-            <a:avLst/>
-            <a:gdLst/>
-            <a:ahLst/>
-            <a:cxnLst/>
-            <a:rect l="l" t="t" r="r" b="b"/>
-            <a:pathLst>
-              <a:path w="120000" h="120000" extrusionOk="0">
-                <a:moveTo>
-                  <a:pt x="0" y="0"/>
-                </a:moveTo>
-                <a:lnTo>
-                  <a:pt x="120000" y="0"/>
-                </a:lnTo>
-                <a:lnTo>
-                  <a:pt x="120000" y="120000"/>
-                </a:lnTo>
-                <a:lnTo>
-                  <a:pt x="0" y="120000"/>
-                </a:lnTo>
-                <a:close/>
-              </a:path>
-            </a:pathLst>
-          </a:custGeom>
-          <a:noFill/>
-          <a:ln w="9525" cap="flat" cmpd="sng">
-            <a:solidFill>
-              <a:srgbClr val="000000"/>
-            </a:solidFill>
-            <a:prstDash val="solid"/>
-            <a:round/>
-            <a:headEnd type="none" w="sm" len="sm"/>
-            <a:tailEnd type="none" w="sm" len="sm"/>
-          </a:ln>
-        </p:spPr>
-      </p:sp>
-      <p:sp>
-        <p:nvSpPr>
-          <p:cNvPr id="173" name="Google Shape;173;g2cd30dbf4aa_0_267:notes"/>
-          <p:cNvSpPr txBox="1">
-            <a:spLocks noGrp="1"/>
-          </p:cNvSpPr>
-          <p:nvPr>
-            <p:ph type="body" idx="1"/>
-          </p:nvPr>
-        </p:nvSpPr>
-        <p:spPr>
-          <a:xfrm>
-            <a:off x="685800" y="4343400"/>
-            <a:ext cx="5486400" cy="4114800"/>
-          </a:xfrm>
-          <a:prstGeom prst="rect">
-            <a:avLst/>
-          </a:prstGeom>
-          <a:noFill/>
-          <a:ln>
-            <a:noFill/>
-          </a:ln>
-        </p:spPr>
-        <p:txBody>
-          <a:bodyPr spcFirstLastPara="1" wrap="square" lIns="91425" tIns="91425" rIns="91425" bIns="91425" anchor="t" anchorCtr="0">
-            <a:noAutofit/>
-          </a:bodyPr>
-          <a:lstStyle/>
-          <a:p>
-            <a:pPr marL="0" lvl="0" indent="0" algn="l" rtl="0">
-              <a:lnSpc>
-                <a:spcPct val="100000"/>
-              </a:lnSpc>
-              <a:spcBef>
-                <a:spcPts val="0"/>
-              </a:spcBef>
-              <a:spcAft>
-                <a:spcPts val="0"/>
-              </a:spcAft>
-              <a:buSzPts val="1100"/>
-              <a:buNone/>
-            </a:pPr>
-            <a:endParaRPr/>
-          </a:p>
-        </p:txBody>
-      </p:sp>
-    </p:spTree>
   </p:cSld>
   <p:clrMapOvr>
     <a:masterClrMapping/>
@@ -25900,6 +26192,243 @@
   <p:cSld>
     <p:spTree>
       <p:nvGrpSpPr>
+        <p:cNvPr id="1" name="Shape 187">
+          <a:extLst>
+            <a:ext uri="{FF2B5EF4-FFF2-40B4-BE49-F238E27FC236}">
+              <a16:creationId xmlns:a16="http://schemas.microsoft.com/office/drawing/2014/main" id="{AD8425B6-CFFB-7E1D-5080-1DE2356F916C}"/>
+            </a:ext>
+          </a:extLst>
+        </p:cNvPr>
+        <p:cNvGrpSpPr/>
+        <p:nvPr/>
+      </p:nvGrpSpPr>
+      <p:grpSpPr>
+        <a:xfrm>
+          <a:off x="0" y="0"/>
+          <a:ext cx="0" cy="0"/>
+          <a:chOff x="0" y="0"/>
+          <a:chExt cx="0" cy="0"/>
+        </a:xfrm>
+      </p:grpSpPr>
+      <p:sp>
+        <p:nvSpPr>
+          <p:cNvPr id="188" name="Google Shape;188;p40">
+            <a:extLst>
+              <a:ext uri="{FF2B5EF4-FFF2-40B4-BE49-F238E27FC236}">
+                <a16:creationId xmlns:a16="http://schemas.microsoft.com/office/drawing/2014/main" id="{39A4BBA8-D426-8A25-8080-45F9E2428B63}"/>
+              </a:ext>
+            </a:extLst>
+          </p:cNvPr>
+          <p:cNvSpPr txBox="1"/>
+          <p:nvPr/>
+        </p:nvSpPr>
+        <p:spPr>
+          <a:xfrm>
+            <a:off x="468977" y="92417"/>
+            <a:ext cx="8520600" cy="572700"/>
+          </a:xfrm>
+          <a:prstGeom prst="rect">
+            <a:avLst/>
+          </a:prstGeom>
+          <a:noFill/>
+          <a:ln>
+            <a:noFill/>
+          </a:ln>
+        </p:spPr>
+        <p:txBody>
+          <a:bodyPr spcFirstLastPara="1" wrap="square" lIns="91425" tIns="91425" rIns="91425" bIns="91425" anchor="t" anchorCtr="0">
+            <a:noAutofit/>
+          </a:bodyPr>
+          <a:lstStyle/>
+          <a:p>
+            <a:pPr marL="0" marR="0" lvl="0" indent="0" algn="l" rtl="0">
+              <a:lnSpc>
+                <a:spcPct val="100000"/>
+              </a:lnSpc>
+              <a:spcBef>
+                <a:spcPts val="0"/>
+              </a:spcBef>
+              <a:spcAft>
+                <a:spcPts val="0"/>
+              </a:spcAft>
+              <a:buClr>
+                <a:srgbClr val="000000"/>
+              </a:buClr>
+              <a:buSzPts val="2200"/>
+              <a:buFont typeface="Arial"/>
+              <a:buNone/>
+            </a:pPr>
+            <a:r>
+              <a:rPr lang="en-US" sz="2200" b="1" i="0" u="none" strike="noStrike" cap="none" dirty="0">
+                <a:solidFill>
+                  <a:schemeClr val="lt2"/>
+                </a:solidFill>
+                <a:latin typeface="Century Gothic"/>
+                <a:ea typeface="Century Gothic"/>
+                <a:cs typeface="Century Gothic"/>
+                <a:sym typeface="Century Gothic"/>
+              </a:rPr>
+              <a:t>Initial Exploratory Data Analysis (EDA)</a:t>
+            </a:r>
+            <a:endParaRPr sz="2200" b="1" i="0" u="none" strike="noStrike" cap="none" dirty="0">
+              <a:solidFill>
+                <a:schemeClr val="lt2"/>
+              </a:solidFill>
+              <a:latin typeface="Century Gothic"/>
+              <a:ea typeface="Century Gothic"/>
+              <a:cs typeface="Century Gothic"/>
+              <a:sym typeface="Century Gothic"/>
+            </a:endParaRPr>
+          </a:p>
+        </p:txBody>
+      </p:sp>
+      <p:sp>
+        <p:nvSpPr>
+          <p:cNvPr id="190" name="Google Shape;190;p40">
+            <a:extLst>
+              <a:ext uri="{FF2B5EF4-FFF2-40B4-BE49-F238E27FC236}">
+                <a16:creationId xmlns:a16="http://schemas.microsoft.com/office/drawing/2014/main" id="{EABC3B1E-41FF-A70C-1FF3-E07E62BB6440}"/>
+              </a:ext>
+            </a:extLst>
+          </p:cNvPr>
+          <p:cNvSpPr txBox="1">
+            <a:spLocks noGrp="1"/>
+          </p:cNvSpPr>
+          <p:nvPr>
+            <p:ph type="body" idx="1"/>
+          </p:nvPr>
+        </p:nvSpPr>
+        <p:spPr>
+          <a:xfrm>
+            <a:off x="1091076" y="4379495"/>
+            <a:ext cx="8783321" cy="483692"/>
+          </a:xfrm>
+          <a:prstGeom prst="rect">
+            <a:avLst/>
+          </a:prstGeom>
+          <a:noFill/>
+          <a:ln>
+            <a:noFill/>
+          </a:ln>
+        </p:spPr>
+        <p:txBody>
+          <a:bodyPr spcFirstLastPara="1" wrap="square" lIns="91425" tIns="91425" rIns="91425" bIns="91425" anchor="t" anchorCtr="0">
+            <a:spAutoFit/>
+          </a:bodyPr>
+          <a:lstStyle/>
+          <a:p>
+            <a:pPr marL="0" indent="0" algn="just">
+              <a:spcBef>
+                <a:spcPts val="400"/>
+              </a:spcBef>
+              <a:buClr>
+                <a:schemeClr val="dk1"/>
+              </a:buClr>
+              <a:buSzPts val="1400"/>
+              <a:buNone/>
+            </a:pPr>
+            <a:r>
+              <a:rPr lang="en-US" sz="1400" dirty="0"/>
+              <a:t>Table containing a random sampling of 20 rows from the imported raw dataset.</a:t>
+            </a:r>
+            <a:endParaRPr lang="en-US" sz="1400" dirty="0">
+              <a:solidFill>
+                <a:schemeClr val="dk1"/>
+              </a:solidFill>
+              <a:latin typeface="Nunito" pitchFamily="2" charset="0"/>
+              <a:ea typeface="Century Gothic"/>
+              <a:cs typeface="Century Gothic"/>
+              <a:sym typeface="Century Gothic"/>
+            </a:endParaRPr>
+          </a:p>
+        </p:txBody>
+      </p:sp>
+      <p:sp>
+        <p:nvSpPr>
+          <p:cNvPr id="2" name="Slide Number Placeholder 1">
+            <a:extLst>
+              <a:ext uri="{FF2B5EF4-FFF2-40B4-BE49-F238E27FC236}">
+                <a16:creationId xmlns:a16="http://schemas.microsoft.com/office/drawing/2014/main" id="{650DA881-C9C3-FB6F-53AE-60914FEC5835}"/>
+              </a:ext>
+            </a:extLst>
+          </p:cNvPr>
+          <p:cNvSpPr>
+            <a:spLocks noGrp="1"/>
+          </p:cNvSpPr>
+          <p:nvPr>
+            <p:ph type="sldNum" idx="12"/>
+          </p:nvPr>
+        </p:nvSpPr>
+        <p:spPr/>
+        <p:txBody>
+          <a:bodyPr/>
+          <a:lstStyle/>
+          <a:p>
+            <a:pPr marL="0" lvl="0" indent="0" algn="ctr" rtl="0">
+              <a:spcBef>
+                <a:spcPts val="0"/>
+              </a:spcBef>
+              <a:spcAft>
+                <a:spcPts val="0"/>
+              </a:spcAft>
+              <a:buNone/>
+            </a:pPr>
+            <a:fld id="{00000000-1234-1234-1234-123412341234}" type="slidenum">
+              <a:rPr lang="en-US" smtClean="0"/>
+              <a:t>10</a:t>
+            </a:fld>
+            <a:endParaRPr lang="en-US"/>
+          </a:p>
+        </p:txBody>
+      </p:sp>
+      <p:pic>
+        <p:nvPicPr>
+          <p:cNvPr id="7" name="Picture 6">
+            <a:extLst>
+              <a:ext uri="{FF2B5EF4-FFF2-40B4-BE49-F238E27FC236}">
+                <a16:creationId xmlns:a16="http://schemas.microsoft.com/office/drawing/2014/main" id="{8970859E-DC9B-C65D-C5FC-18E39CFEDE67}"/>
+              </a:ext>
+            </a:extLst>
+          </p:cNvPr>
+          <p:cNvPicPr>
+            <a:picLocks noChangeAspect="1"/>
+          </p:cNvPicPr>
+          <p:nvPr/>
+        </p:nvPicPr>
+        <p:blipFill>
+          <a:blip r:embed="rId3"/>
+          <a:stretch>
+            <a:fillRect/>
+          </a:stretch>
+        </p:blipFill>
+        <p:spPr>
+          <a:xfrm>
+            <a:off x="605016" y="880488"/>
+            <a:ext cx="7693335" cy="3283636"/>
+          </a:xfrm>
+          <a:prstGeom prst="rect">
+            <a:avLst/>
+          </a:prstGeom>
+        </p:spPr>
+      </p:pic>
+    </p:spTree>
+    <p:extLst>
+      <p:ext uri="{BB962C8B-B14F-4D97-AF65-F5344CB8AC3E}">
+        <p14:creationId xmlns:p14="http://schemas.microsoft.com/office/powerpoint/2010/main" val="3895439057"/>
+      </p:ext>
+    </p:extLst>
+  </p:cSld>
+  <p:clrMapOvr>
+    <a:masterClrMapping/>
+  </p:clrMapOvr>
+</p:sld>
+</file>
+
+<file path=ppt/slides/slide11.xml><?xml version="1.0" encoding="utf-8"?>
+<p:sld xmlns:a="http://schemas.openxmlformats.org/drawingml/2006/main" xmlns:r="http://schemas.openxmlformats.org/officeDocument/2006/relationships" xmlns:p="http://schemas.openxmlformats.org/presentationml/2006/main">
+  <p:cSld>
+    <p:spTree>
+      <p:nvGrpSpPr>
         <p:cNvPr id="1" name="Shape 162">
           <a:extLst>
             <a:ext uri="{FF2B5EF4-FFF2-40B4-BE49-F238E27FC236}">
@@ -26008,8 +26537,8 @@
         </p:nvSpPr>
         <p:spPr>
           <a:xfrm>
-            <a:off x="202550" y="1243025"/>
-            <a:ext cx="8629800" cy="3611200"/>
+            <a:off x="202550" y="988643"/>
+            <a:ext cx="8629800" cy="3631483"/>
           </a:xfrm>
           <a:prstGeom prst="rect">
             <a:avLst/>
@@ -26037,7 +26566,7 @@
             </a:pPr>
             <a:r>
               <a:rPr lang="en-US" sz="1400" b="1" dirty="0"/>
-              <a:t>Goal:</a:t>
+              <a:t>Ground Truth Summary:</a:t>
             </a:r>
           </a:p>
           <a:p>
@@ -26058,15 +26587,27 @@
               <a:buNone/>
             </a:pPr>
             <a:r>
+              <a:rPr lang="en-US" sz="1400" b="1" dirty="0"/>
+              <a:t>Ground Truth</a:t>
+            </a:r>
+            <a:r>
               <a:rPr lang="en-US" sz="1400" dirty="0"/>
-              <a:t>A bank's consumer credit department seeks to streamline the decision-making process for home equity lines of credit. In compliance with the Equal Credit Opportunity Act (ECOA), the department requires an empirically derived and statistically sound credit scoring model.</a:t>
+              <a:t> (</a:t>
+            </a:r>
+            <a:r>
+              <a:rPr lang="en-US" sz="1400" b="1" dirty="0"/>
+              <a:t>GT</a:t>
+            </a:r>
+            <a:r>
+              <a:rPr lang="en-US" sz="1400" dirty="0"/>
+              <a:t>) is a subset of the data with manually created verified, correct labels that represent the known right answers. It is used as a benchmark to measure how well the prompts perform. Without it, accuracy, precision, recall, or F1-scores cannot be calculated. It should be recognized that since it was created manually, it is subject to human biases.</a:t>
             </a:r>
           </a:p>
           <a:p>
             <a:pPr marL="133350" indent="0">
               <a:buNone/>
             </a:pPr>
-            <a:endParaRPr lang="en-US" sz="700" dirty="0"/>
+            <a:endParaRPr lang="en-US" sz="1400" dirty="0"/>
           </a:p>
           <a:p>
             <a:pPr marL="133350" indent="0">
@@ -26074,46 +26615,69 @@
             </a:pPr>
             <a:r>
               <a:rPr lang="en-US" sz="1400" dirty="0"/>
-              <a:t>The model will be developed using data collected through the existing loan underwriting process from recent applicants who were granted credit. The model needs to be interpretable to provide reasonings for loan acceptances/rejections.</a:t>
+              <a:t>To create the </a:t>
+            </a:r>
+            <a:r>
+              <a:rPr lang="en-US" sz="1400" b="1" dirty="0"/>
+              <a:t>GT</a:t>
+            </a:r>
+            <a:r>
+              <a:rPr lang="en-US" sz="1400" dirty="0"/>
+              <a:t>, 36 reviews were selected from the dataset. Each one was examined, then manually classified as </a:t>
+            </a:r>
+            <a:r>
+              <a:rPr lang="en-US" sz="1400" b="1" dirty="0"/>
+              <a:t>Positive</a:t>
+            </a:r>
+            <a:r>
+              <a:rPr lang="en-US" sz="1400" dirty="0"/>
+              <a:t>, </a:t>
+            </a:r>
+            <a:r>
+              <a:rPr lang="en-US" sz="1400" b="1" dirty="0"/>
+              <a:t>Negative</a:t>
+            </a:r>
+            <a:r>
+              <a:rPr lang="en-US" sz="1400" dirty="0"/>
+              <a:t>, or </a:t>
+            </a:r>
+            <a:r>
+              <a:rPr lang="en-US" sz="1400" b="1" dirty="0"/>
+              <a:t>Neutral</a:t>
+            </a:r>
+            <a:r>
+              <a:rPr lang="en-US" sz="1400" dirty="0"/>
+              <a:t>, and assigned appropriate tags This was saved as the reference dataset. This step must be completed before running any prompts to prevent bias.</a:t>
             </a:r>
           </a:p>
           <a:p>
             <a:pPr marL="133350" indent="0">
               <a:buNone/>
             </a:pPr>
-            <a:endParaRPr lang="en-US" sz="700" dirty="0"/>
+            <a:endParaRPr lang="en-US" sz="1400" dirty="0"/>
           </a:p>
           <a:p>
-            <a:pPr marL="139700" indent="0">
-              <a:spcBef>
-                <a:spcPts val="1000"/>
-              </a:spcBef>
-              <a:buClr>
-                <a:schemeClr val="dk1"/>
-              </a:buClr>
-              <a:buSzPts val="1400"/>
+            <a:pPr marL="133350" indent="0">
               <a:buNone/>
             </a:pPr>
             <a:r>
+              <a:rPr lang="en-US" sz="1400" dirty="0"/>
+              <a:t>To use, each prompt variation was run on the raw version of the rows in the GT.  The models’ raw data output was compared against the </a:t>
+            </a:r>
+            <a:r>
               <a:rPr lang="en-US" sz="1400" b="1" dirty="0"/>
-              <a:t>Objective:</a:t>
+              <a:t>GT. </a:t>
+            </a:r>
+            <a:r>
+              <a:rPr lang="en-US" sz="1400" dirty="0"/>
+              <a:t>This technique was used to select the best performer of each prompt type.</a:t>
             </a:r>
           </a:p>
           <a:p>
-            <a:pPr marL="139700" indent="0">
-              <a:spcBef>
-                <a:spcPts val="1000"/>
-              </a:spcBef>
-              <a:buClr>
-                <a:schemeClr val="dk1"/>
-              </a:buClr>
-              <a:buSzPts val="1400"/>
+            <a:pPr marL="133350" indent="0">
               <a:buNone/>
             </a:pPr>
-            <a:r>
-              <a:rPr lang="en-US" sz="1400" dirty="0"/>
-              <a:t>Build a classification model using an Artificial Neural Network (ANN) to predict clients who are likely to default on  loans. The model should provide recommendations on the key features to consider during loan approval.</a:t>
-            </a:r>
+            <a:endParaRPr lang="en-US" sz="700" dirty="0"/>
           </a:p>
         </p:txBody>
       </p:sp>
@@ -26130,7 +26694,277 @@
 </p:sld>
 </file>
 
-<file path=ppt/slides/slide11.xml><?xml version="1.0" encoding="utf-8"?>
+<file path=ppt/slides/slide12.xml><?xml version="1.0" encoding="utf-8"?>
+<p:sld xmlns:a="http://schemas.openxmlformats.org/drawingml/2006/main" xmlns:r="http://schemas.openxmlformats.org/officeDocument/2006/relationships" xmlns:p="http://schemas.openxmlformats.org/presentationml/2006/main">
+  <p:cSld>
+    <p:spTree>
+      <p:nvGrpSpPr>
+        <p:cNvPr id="1" name="Shape 162">
+          <a:extLst>
+            <a:ext uri="{FF2B5EF4-FFF2-40B4-BE49-F238E27FC236}">
+              <a16:creationId xmlns:a16="http://schemas.microsoft.com/office/drawing/2014/main" id="{A69A9308-F83F-3C84-FE51-72CE48D33AE0}"/>
+            </a:ext>
+          </a:extLst>
+        </p:cNvPr>
+        <p:cNvGrpSpPr/>
+        <p:nvPr/>
+      </p:nvGrpSpPr>
+      <p:grpSpPr>
+        <a:xfrm>
+          <a:off x="0" y="0"/>
+          <a:ext cx="0" cy="0"/>
+          <a:chOff x="0" y="0"/>
+          <a:chExt cx="0" cy="0"/>
+        </a:xfrm>
+      </p:grpSpPr>
+      <p:sp>
+        <p:nvSpPr>
+          <p:cNvPr id="163" name="Google Shape;163;p37">
+            <a:extLst>
+              <a:ext uri="{FF2B5EF4-FFF2-40B4-BE49-F238E27FC236}">
+                <a16:creationId xmlns:a16="http://schemas.microsoft.com/office/drawing/2014/main" id="{FFBDDFD1-6ED2-1F69-CFD1-9C123D54F116}"/>
+              </a:ext>
+            </a:extLst>
+          </p:cNvPr>
+          <p:cNvSpPr txBox="1">
+            <a:spLocks noGrp="1"/>
+          </p:cNvSpPr>
+          <p:nvPr>
+            <p:ph type="title"/>
+          </p:nvPr>
+        </p:nvSpPr>
+        <p:spPr>
+          <a:xfrm>
+            <a:off x="202550" y="289275"/>
+            <a:ext cx="7712700" cy="810900"/>
+          </a:xfrm>
+          <a:prstGeom prst="rect">
+            <a:avLst/>
+          </a:prstGeom>
+          <a:noFill/>
+          <a:ln>
+            <a:noFill/>
+          </a:ln>
+        </p:spPr>
+        <p:txBody>
+          <a:bodyPr spcFirstLastPara="1" wrap="square" lIns="91425" tIns="91425" rIns="91425" bIns="91425" anchor="t" anchorCtr="0">
+            <a:noAutofit/>
+          </a:bodyPr>
+          <a:lstStyle/>
+          <a:p>
+            <a:pPr marL="0" lvl="0" indent="0" algn="l" rtl="0">
+              <a:lnSpc>
+                <a:spcPct val="100000"/>
+              </a:lnSpc>
+              <a:spcBef>
+                <a:spcPts val="0"/>
+              </a:spcBef>
+              <a:spcAft>
+                <a:spcPts val="0"/>
+              </a:spcAft>
+              <a:buSzPts val="2200"/>
+              <a:buNone/>
+            </a:pPr>
+            <a:r>
+              <a:rPr lang="en" dirty="0">
+                <a:solidFill>
+                  <a:schemeClr val="lt2"/>
+                </a:solidFill>
+                <a:latin typeface="Century Gothic"/>
+                <a:ea typeface="Century Gothic"/>
+                <a:cs typeface="Century Gothic"/>
+                <a:sym typeface="Century Gothic"/>
+              </a:rPr>
+              <a:t>Ground Truth Dataset</a:t>
+            </a:r>
+            <a:endParaRPr dirty="0">
+              <a:solidFill>
+                <a:schemeClr val="lt2"/>
+              </a:solidFill>
+              <a:latin typeface="Century Gothic"/>
+              <a:ea typeface="Century Gothic"/>
+              <a:cs typeface="Century Gothic"/>
+              <a:sym typeface="Century Gothic"/>
+            </a:endParaRPr>
+          </a:p>
+        </p:txBody>
+      </p:sp>
+      <p:sp>
+        <p:nvSpPr>
+          <p:cNvPr id="164" name="Google Shape;164;p37">
+            <a:extLst>
+              <a:ext uri="{FF2B5EF4-FFF2-40B4-BE49-F238E27FC236}">
+                <a16:creationId xmlns:a16="http://schemas.microsoft.com/office/drawing/2014/main" id="{B3ECEC4E-5829-ECD5-8895-6CE8D260BABC}"/>
+              </a:ext>
+            </a:extLst>
+          </p:cNvPr>
+          <p:cNvSpPr txBox="1">
+            <a:spLocks noGrp="1"/>
+          </p:cNvSpPr>
+          <p:nvPr>
+            <p:ph type="body" idx="1"/>
+          </p:nvPr>
+        </p:nvSpPr>
+        <p:spPr>
+          <a:xfrm>
+            <a:off x="257100" y="961142"/>
+            <a:ext cx="8629800" cy="3631483"/>
+          </a:xfrm>
+          <a:prstGeom prst="rect">
+            <a:avLst/>
+          </a:prstGeom>
+          <a:noFill/>
+          <a:ln>
+            <a:noFill/>
+          </a:ln>
+        </p:spPr>
+        <p:txBody>
+          <a:bodyPr spcFirstLastPara="1" wrap="square" lIns="91425" tIns="91425" rIns="91425" bIns="91425" anchor="t" anchorCtr="0">
+            <a:noAutofit/>
+          </a:bodyPr>
+          <a:lstStyle/>
+          <a:p>
+            <a:pPr marL="139700" indent="0">
+              <a:spcBef>
+                <a:spcPts val="1000"/>
+              </a:spcBef>
+              <a:buClr>
+                <a:schemeClr val="dk1"/>
+              </a:buClr>
+              <a:buSzPts val="1400"/>
+              <a:buNone/>
+            </a:pPr>
+            <a:r>
+              <a:rPr lang="en-US" sz="1400" b="1" dirty="0"/>
+              <a:t>Ground Truth Summary:</a:t>
+            </a:r>
+          </a:p>
+          <a:p>
+            <a:pPr marL="139700" indent="0">
+              <a:spcBef>
+                <a:spcPts val="400"/>
+              </a:spcBef>
+              <a:buClr>
+                <a:schemeClr val="dk1"/>
+              </a:buClr>
+              <a:buSzPts val="1400"/>
+              <a:buNone/>
+            </a:pPr>
+            <a:endParaRPr lang="en-US" sz="700" b="1" dirty="0"/>
+          </a:p>
+          <a:p>
+            <a:pPr marL="133350" indent="0">
+              <a:buNone/>
+            </a:pPr>
+            <a:r>
+              <a:rPr lang="en-US" sz="1400" b="1" dirty="0"/>
+              <a:t>Ground Truth</a:t>
+            </a:r>
+            <a:r>
+              <a:rPr lang="en-US" sz="1400" dirty="0"/>
+              <a:t> (</a:t>
+            </a:r>
+            <a:r>
+              <a:rPr lang="en-US" sz="1400" b="1" dirty="0"/>
+              <a:t>GT</a:t>
+            </a:r>
+            <a:r>
+              <a:rPr lang="en-US" sz="1400" dirty="0"/>
+              <a:t>) is a subset of the data with manually created verified, correct labels that represent the known right answers. It is used as a benchmark to measure how well the prompts perform. Without it, accuracy, precision, recall, or F1-scores cannot be calculated. It should be recognized that since it was created manually, it is subject to human biases.</a:t>
+            </a:r>
+          </a:p>
+          <a:p>
+            <a:pPr marL="133350" indent="0">
+              <a:buNone/>
+            </a:pPr>
+            <a:endParaRPr lang="en-US" sz="1400" dirty="0"/>
+          </a:p>
+          <a:p>
+            <a:pPr marL="133350" indent="0">
+              <a:buNone/>
+            </a:pPr>
+            <a:r>
+              <a:rPr lang="en-US" sz="1400" dirty="0"/>
+              <a:t>To create the </a:t>
+            </a:r>
+            <a:r>
+              <a:rPr lang="en-US" sz="1400" b="1" dirty="0"/>
+              <a:t>GT</a:t>
+            </a:r>
+            <a:r>
+              <a:rPr lang="en-US" sz="1400" dirty="0"/>
+              <a:t>, 36 reviews were selected from the dataset. Each one was examined, then manually classified as </a:t>
+            </a:r>
+            <a:r>
+              <a:rPr lang="en-US" sz="1400" b="1" dirty="0"/>
+              <a:t>Positive</a:t>
+            </a:r>
+            <a:r>
+              <a:rPr lang="en-US" sz="1400" dirty="0"/>
+              <a:t>, </a:t>
+            </a:r>
+            <a:r>
+              <a:rPr lang="en-US" sz="1400" b="1" dirty="0"/>
+              <a:t>Negative</a:t>
+            </a:r>
+            <a:r>
+              <a:rPr lang="en-US" sz="1400" dirty="0"/>
+              <a:t>, or </a:t>
+            </a:r>
+            <a:r>
+              <a:rPr lang="en-US" sz="1400" b="1" dirty="0"/>
+              <a:t>Neutral</a:t>
+            </a:r>
+            <a:r>
+              <a:rPr lang="en-US" sz="1400" dirty="0"/>
+              <a:t>, and assigned appropriate tags This was saved as the reference dataset. This step must be completed before running any prompts to prevent bias.</a:t>
+            </a:r>
+          </a:p>
+          <a:p>
+            <a:pPr marL="133350" indent="0">
+              <a:buNone/>
+            </a:pPr>
+            <a:endParaRPr lang="en-US" sz="1400" dirty="0"/>
+          </a:p>
+          <a:p>
+            <a:pPr marL="133350" indent="0">
+              <a:buNone/>
+            </a:pPr>
+            <a:r>
+              <a:rPr lang="en-US" sz="1400" dirty="0"/>
+              <a:t>To use, each prompt variation was run on the raw version of the rows in the GT.  The models’ raw data output was compared against the </a:t>
+            </a:r>
+            <a:r>
+              <a:rPr lang="en-US" sz="1400" b="1" dirty="0"/>
+              <a:t>GT. </a:t>
+            </a:r>
+            <a:r>
+              <a:rPr lang="en-US" sz="1400" dirty="0"/>
+              <a:t>This technique was used to select the best performer of each prompt type.</a:t>
+            </a:r>
+          </a:p>
+          <a:p>
+            <a:pPr marL="133350" indent="0">
+              <a:buNone/>
+            </a:pPr>
+            <a:endParaRPr lang="en-US" sz="700" dirty="0"/>
+          </a:p>
+        </p:txBody>
+      </p:sp>
+    </p:spTree>
+    <p:extLst>
+      <p:ext uri="{BB962C8B-B14F-4D97-AF65-F5344CB8AC3E}">
+        <p14:creationId xmlns:p14="http://schemas.microsoft.com/office/powerpoint/2010/main" val="1909205762"/>
+      </p:ext>
+    </p:extLst>
+  </p:cSld>
+  <p:clrMapOvr>
+    <a:masterClrMapping/>
+  </p:clrMapOvr>
+</p:sld>
+</file>
+
+<file path=ppt/slides/slide13.xml><?xml version="1.0" encoding="utf-8"?>
 <p:sld xmlns:a="http://schemas.openxmlformats.org/drawingml/2006/main" xmlns:r="http://schemas.openxmlformats.org/officeDocument/2006/relationships" xmlns:p="http://schemas.openxmlformats.org/presentationml/2006/main">
   <p:cSld>
     <p:spTree>
@@ -26225,133 +27059,36 @@
           </a:p>
         </p:txBody>
       </p:sp>
-      <p:sp>
-        <p:nvSpPr>
-          <p:cNvPr id="164" name="Google Shape;164;p37">
+      <p:pic>
+        <p:nvPicPr>
+          <p:cNvPr id="5" name="Picture 4">
             <a:extLst>
               <a:ext uri="{FF2B5EF4-FFF2-40B4-BE49-F238E27FC236}">
-                <a16:creationId xmlns:a16="http://schemas.microsoft.com/office/drawing/2014/main" id="{D9F1B83F-7B25-BA55-F843-A200F6AC3B7A}"/>
+                <a16:creationId xmlns:a16="http://schemas.microsoft.com/office/drawing/2014/main" id="{C0A68AB8-6C35-D7F6-7AAC-0F57B471F0F5}"/>
               </a:ext>
             </a:extLst>
           </p:cNvPr>
-          <p:cNvSpPr txBox="1">
-            <a:spLocks noGrp="1"/>
-          </p:cNvSpPr>
-          <p:nvPr>
-            <p:ph type="body" idx="1"/>
-          </p:nvPr>
-        </p:nvSpPr>
+          <p:cNvPicPr>
+            <a:picLocks noChangeAspect="1"/>
+          </p:cNvPicPr>
+          <p:nvPr/>
+        </p:nvPicPr>
+        <p:blipFill>
+          <a:blip r:embed="rId3"/>
+          <a:stretch>
+            <a:fillRect/>
+          </a:stretch>
+        </p:blipFill>
         <p:spPr>
           <a:xfrm>
-            <a:off x="202550" y="1243025"/>
-            <a:ext cx="8629800" cy="3611200"/>
+            <a:off x="721430" y="811273"/>
+            <a:ext cx="7563172" cy="3958637"/>
           </a:xfrm>
           <a:prstGeom prst="rect">
             <a:avLst/>
           </a:prstGeom>
-          <a:noFill/>
-          <a:ln>
-            <a:noFill/>
-          </a:ln>
         </p:spPr>
-        <p:txBody>
-          <a:bodyPr spcFirstLastPara="1" wrap="square" lIns="91425" tIns="91425" rIns="91425" bIns="91425" anchor="t" anchorCtr="0">
-            <a:noAutofit/>
-          </a:bodyPr>
-          <a:lstStyle/>
-          <a:p>
-            <a:pPr marL="139700" indent="0">
-              <a:spcBef>
-                <a:spcPts val="1000"/>
-              </a:spcBef>
-              <a:buClr>
-                <a:schemeClr val="dk1"/>
-              </a:buClr>
-              <a:buSzPts val="1400"/>
-              <a:buNone/>
-            </a:pPr>
-            <a:r>
-              <a:rPr lang="en-US" sz="1400" b="1" dirty="0"/>
-              <a:t>Goal:</a:t>
-            </a:r>
-          </a:p>
-          <a:p>
-            <a:pPr marL="139700" indent="0">
-              <a:spcBef>
-                <a:spcPts val="400"/>
-              </a:spcBef>
-              <a:buClr>
-                <a:schemeClr val="dk1"/>
-              </a:buClr>
-              <a:buSzPts val="1400"/>
-              <a:buNone/>
-            </a:pPr>
-            <a:endParaRPr lang="en-US" sz="700" b="1" dirty="0"/>
-          </a:p>
-          <a:p>
-            <a:pPr marL="133350" indent="0">
-              <a:buNone/>
-            </a:pPr>
-            <a:r>
-              <a:rPr lang="en-US" sz="1400" dirty="0"/>
-              <a:t>A bank's consumer credit department seeks to streamline the decision-making process for home equity lines of credit. In compliance with the Equal Credit Opportunity Act (ECOA), the department requires an empirically derived and statistically sound credit scoring model.</a:t>
-            </a:r>
-          </a:p>
-          <a:p>
-            <a:pPr marL="133350" indent="0">
-              <a:buNone/>
-            </a:pPr>
-            <a:endParaRPr lang="en-US" sz="700" dirty="0"/>
-          </a:p>
-          <a:p>
-            <a:pPr marL="133350" indent="0">
-              <a:buNone/>
-            </a:pPr>
-            <a:r>
-              <a:rPr lang="en-US" sz="1400" dirty="0"/>
-              <a:t>The model will be developed using data collected through the existing loan underwriting process from recent applicants who were granted credit. The model needs to be interpretable to provide reasonings for loan acceptances/rejections.</a:t>
-            </a:r>
-          </a:p>
-          <a:p>
-            <a:pPr marL="133350" indent="0">
-              <a:buNone/>
-            </a:pPr>
-            <a:endParaRPr lang="en-US" sz="700" dirty="0"/>
-          </a:p>
-          <a:p>
-            <a:pPr marL="139700" indent="0">
-              <a:spcBef>
-                <a:spcPts val="1000"/>
-              </a:spcBef>
-              <a:buClr>
-                <a:schemeClr val="dk1"/>
-              </a:buClr>
-              <a:buSzPts val="1400"/>
-              <a:buNone/>
-            </a:pPr>
-            <a:r>
-              <a:rPr lang="en-US" sz="1400" b="1" dirty="0"/>
-              <a:t>Objective:</a:t>
-            </a:r>
-          </a:p>
-          <a:p>
-            <a:pPr marL="139700" indent="0">
-              <a:spcBef>
-                <a:spcPts val="1000"/>
-              </a:spcBef>
-              <a:buClr>
-                <a:schemeClr val="dk1"/>
-              </a:buClr>
-              <a:buSzPts val="1400"/>
-              <a:buNone/>
-            </a:pPr>
-            <a:r>
-              <a:rPr lang="en-US" sz="1400" dirty="0"/>
-              <a:t>Build a classification model using an Artificial Neural Network (ANN) to predict clients who are likely to default on  loans. The model should provide recommendations on the key features to consider during loan approval.</a:t>
-            </a:r>
-          </a:p>
-        </p:txBody>
-      </p:sp>
+      </p:pic>
     </p:spTree>
     <p:extLst>
       <p:ext uri="{BB962C8B-B14F-4D97-AF65-F5344CB8AC3E}">
@@ -26365,7 +27102,7 @@
 </p:sld>
 </file>
 
-<file path=ppt/slides/slide12.xml><?xml version="1.0" encoding="utf-8"?>
+<file path=ppt/slides/slide14.xml><?xml version="1.0" encoding="utf-8"?>
 <p:sld xmlns:a="http://schemas.openxmlformats.org/drawingml/2006/main" xmlns:r="http://schemas.openxmlformats.org/officeDocument/2006/relationships" xmlns:p="http://schemas.openxmlformats.org/presentationml/2006/main">
   <p:cSld>
     <p:spTree>
@@ -26638,7 +27375,7 @@
 </p:sld>
 </file>
 
-<file path=ppt/slides/slide13.xml><?xml version="1.0" encoding="utf-8"?>
+<file path=ppt/slides/slide15.xml><?xml version="1.0" encoding="utf-8"?>
 <p:sld xmlns:a="http://schemas.openxmlformats.org/drawingml/2006/main" xmlns:r="http://schemas.openxmlformats.org/officeDocument/2006/relationships" xmlns:p="http://schemas.openxmlformats.org/presentationml/2006/main">
   <p:cSld>
     <p:spTree>
@@ -26934,7 +27671,7 @@
 </p:sld>
 </file>
 
-<file path=ppt/slides/slide14.xml><?xml version="1.0" encoding="utf-8"?>
+<file path=ppt/slides/slide16.xml><?xml version="1.0" encoding="utf-8"?>
 <p:sld xmlns:a="http://schemas.openxmlformats.org/drawingml/2006/main" xmlns:r="http://schemas.openxmlformats.org/officeDocument/2006/relationships" xmlns:p="http://schemas.openxmlformats.org/presentationml/2006/main">
   <p:cSld>
     <p:spTree>
@@ -27230,7 +27967,7 @@
 </p:sld>
 </file>
 
-<file path=ppt/slides/slide15.xml><?xml version="1.0" encoding="utf-8"?>
+<file path=ppt/slides/slide17.xml><?xml version="1.0" encoding="utf-8"?>
 <p:sld xmlns:a="http://schemas.openxmlformats.org/drawingml/2006/main" xmlns:r="http://schemas.openxmlformats.org/officeDocument/2006/relationships" xmlns:p="http://schemas.openxmlformats.org/presentationml/2006/main">
   <p:cSld>
     <p:spTree>
@@ -27526,7 +28263,7 @@
 </p:sld>
 </file>
 
-<file path=ppt/slides/slide16.xml><?xml version="1.0" encoding="utf-8"?>
+<file path=ppt/slides/slide18.xml><?xml version="1.0" encoding="utf-8"?>
 <p:sld xmlns:a="http://schemas.openxmlformats.org/drawingml/2006/main" xmlns:r="http://schemas.openxmlformats.org/officeDocument/2006/relationships" xmlns:p="http://schemas.openxmlformats.org/presentationml/2006/main">
   <p:cSld>
     <p:spTree>
@@ -27822,7 +28559,7 @@
 </p:sld>
 </file>
 
-<file path=ppt/slides/slide17.xml><?xml version="1.0" encoding="utf-8"?>
+<file path=ppt/slides/slide19.xml><?xml version="1.0" encoding="utf-8"?>
 <p:sld xmlns:a="http://schemas.openxmlformats.org/drawingml/2006/main" xmlns:r="http://schemas.openxmlformats.org/officeDocument/2006/relationships" xmlns:p="http://schemas.openxmlformats.org/presentationml/2006/main">
   <p:cSld>
     <p:spTree>
@@ -28118,7 +28855,368 @@
 </p:sld>
 </file>
 
-<file path=ppt/slides/slide18.xml><?xml version="1.0" encoding="utf-8"?>
+<file path=ppt/slides/slide2.xml><?xml version="1.0" encoding="utf-8"?>
+<p:sld xmlns:a="http://schemas.openxmlformats.org/drawingml/2006/main" xmlns:r="http://schemas.openxmlformats.org/officeDocument/2006/relationships" xmlns:p="http://schemas.openxmlformats.org/presentationml/2006/main">
+  <p:cSld>
+    <p:spTree>
+      <p:nvGrpSpPr>
+        <p:cNvPr id="1" name="Shape 156"/>
+        <p:cNvGrpSpPr/>
+        <p:nvPr/>
+      </p:nvGrpSpPr>
+      <p:grpSpPr>
+        <a:xfrm>
+          <a:off x="0" y="0"/>
+          <a:ext cx="0" cy="0"/>
+          <a:chOff x="0" y="0"/>
+          <a:chExt cx="0" cy="0"/>
+        </a:xfrm>
+      </p:grpSpPr>
+      <p:sp>
+        <p:nvSpPr>
+          <p:cNvPr id="157" name="Google Shape;157;p36"/>
+          <p:cNvSpPr txBox="1">
+            <a:spLocks noGrp="1"/>
+          </p:cNvSpPr>
+          <p:nvPr>
+            <p:ph type="title"/>
+          </p:nvPr>
+        </p:nvSpPr>
+        <p:spPr>
+          <a:xfrm>
+            <a:off x="202550" y="289279"/>
+            <a:ext cx="8520600" cy="572700"/>
+          </a:xfrm>
+          <a:prstGeom prst="rect">
+            <a:avLst/>
+          </a:prstGeom>
+          <a:noFill/>
+          <a:ln>
+            <a:noFill/>
+          </a:ln>
+        </p:spPr>
+        <p:txBody>
+          <a:bodyPr spcFirstLastPara="1" wrap="square" lIns="91425" tIns="91425" rIns="91425" bIns="91425" anchor="t" anchorCtr="0">
+            <a:noAutofit/>
+          </a:bodyPr>
+          <a:lstStyle/>
+          <a:p>
+            <a:pPr marL="0" lvl="0" indent="0" algn="l" rtl="0">
+              <a:lnSpc>
+                <a:spcPct val="100000"/>
+              </a:lnSpc>
+              <a:spcBef>
+                <a:spcPts val="0"/>
+              </a:spcBef>
+              <a:spcAft>
+                <a:spcPts val="0"/>
+              </a:spcAft>
+              <a:buSzPts val="2200"/>
+              <a:buNone/>
+            </a:pPr>
+            <a:r>
+              <a:rPr lang="en">
+                <a:solidFill>
+                  <a:schemeClr val="lt2"/>
+                </a:solidFill>
+                <a:latin typeface="Century Gothic"/>
+                <a:ea typeface="Century Gothic"/>
+                <a:cs typeface="Century Gothic"/>
+                <a:sym typeface="Century Gothic"/>
+              </a:rPr>
+              <a:t>Contents / Agenda</a:t>
+            </a:r>
+            <a:endParaRPr>
+              <a:solidFill>
+                <a:schemeClr val="lt2"/>
+              </a:solidFill>
+              <a:latin typeface="Century Gothic"/>
+              <a:ea typeface="Century Gothic"/>
+              <a:cs typeface="Century Gothic"/>
+              <a:sym typeface="Century Gothic"/>
+            </a:endParaRPr>
+          </a:p>
+        </p:txBody>
+      </p:sp>
+      <p:sp>
+        <p:nvSpPr>
+          <p:cNvPr id="158" name="Google Shape;158;p36"/>
+          <p:cNvSpPr txBox="1">
+            <a:spLocks noGrp="1"/>
+          </p:cNvSpPr>
+          <p:nvPr>
+            <p:ph type="body" idx="1"/>
+          </p:nvPr>
+        </p:nvSpPr>
+        <p:spPr>
+          <a:xfrm>
+            <a:off x="202550" y="861975"/>
+            <a:ext cx="8629800" cy="3706800"/>
+          </a:xfrm>
+          <a:prstGeom prst="rect">
+            <a:avLst/>
+          </a:prstGeom>
+          <a:noFill/>
+          <a:ln>
+            <a:noFill/>
+          </a:ln>
+        </p:spPr>
+        <p:txBody>
+          <a:bodyPr spcFirstLastPara="1" wrap="square" lIns="91425" tIns="91425" rIns="91425" bIns="91425" anchor="t" anchorCtr="0">
+            <a:noAutofit/>
+          </a:bodyPr>
+          <a:lstStyle/>
+          <a:p>
+            <a:pPr marL="457200" lvl="0" indent="-317500" algn="l" rtl="0">
+              <a:lnSpc>
+                <a:spcPct val="115000"/>
+              </a:lnSpc>
+              <a:spcBef>
+                <a:spcPts val="1000"/>
+              </a:spcBef>
+              <a:spcAft>
+                <a:spcPts val="0"/>
+              </a:spcAft>
+              <a:buClr>
+                <a:schemeClr val="dk1"/>
+              </a:buClr>
+              <a:buSzPts val="1400"/>
+              <a:buFont typeface="Century Gothic"/>
+              <a:buChar char="●"/>
+            </a:pPr>
+            <a:r>
+              <a:rPr lang="en" sz="1400">
+                <a:solidFill>
+                  <a:schemeClr val="dk1"/>
+                </a:solidFill>
+                <a:latin typeface="Century Gothic"/>
+                <a:ea typeface="Century Gothic"/>
+                <a:cs typeface="Century Gothic"/>
+                <a:sym typeface="Century Gothic"/>
+              </a:rPr>
+              <a:t>Business Context, Problem Overview and Solution Approach</a:t>
+            </a:r>
+            <a:endParaRPr sz="1400">
+              <a:solidFill>
+                <a:schemeClr val="dk1"/>
+              </a:solidFill>
+              <a:latin typeface="Century Gothic"/>
+              <a:ea typeface="Century Gothic"/>
+              <a:cs typeface="Century Gothic"/>
+              <a:sym typeface="Century Gothic"/>
+            </a:endParaRPr>
+          </a:p>
+          <a:p>
+            <a:pPr marL="457200" lvl="0" indent="-317500" algn="l" rtl="0">
+              <a:lnSpc>
+                <a:spcPct val="115000"/>
+              </a:lnSpc>
+              <a:spcBef>
+                <a:spcPts val="1000"/>
+              </a:spcBef>
+              <a:spcAft>
+                <a:spcPts val="0"/>
+              </a:spcAft>
+              <a:buClr>
+                <a:schemeClr val="dk1"/>
+              </a:buClr>
+              <a:buSzPts val="1400"/>
+              <a:buFont typeface="Century Gothic"/>
+              <a:buChar char="●"/>
+            </a:pPr>
+            <a:r>
+              <a:rPr lang="en" sz="1400">
+                <a:solidFill>
+                  <a:schemeClr val="dk1"/>
+                </a:solidFill>
+                <a:latin typeface="Century Gothic"/>
+                <a:ea typeface="Century Gothic"/>
+                <a:cs typeface="Century Gothic"/>
+                <a:sym typeface="Century Gothic"/>
+              </a:rPr>
+              <a:t>Exploring Different Prompting Techniques</a:t>
+            </a:r>
+            <a:endParaRPr sz="1400">
+              <a:solidFill>
+                <a:schemeClr val="dk1"/>
+              </a:solidFill>
+              <a:latin typeface="Century Gothic"/>
+              <a:ea typeface="Century Gothic"/>
+              <a:cs typeface="Century Gothic"/>
+              <a:sym typeface="Century Gothic"/>
+            </a:endParaRPr>
+          </a:p>
+          <a:p>
+            <a:pPr marL="457200" lvl="0" indent="-317500" algn="l" rtl="0">
+              <a:lnSpc>
+                <a:spcPct val="115000"/>
+              </a:lnSpc>
+              <a:spcBef>
+                <a:spcPts val="1000"/>
+              </a:spcBef>
+              <a:spcAft>
+                <a:spcPts val="0"/>
+              </a:spcAft>
+              <a:buClr>
+                <a:schemeClr val="dk1"/>
+              </a:buClr>
+              <a:buSzPts val="1400"/>
+              <a:buFont typeface="Century Gothic"/>
+              <a:buChar char="●"/>
+            </a:pPr>
+            <a:r>
+              <a:rPr lang="en" sz="1400">
+                <a:solidFill>
+                  <a:schemeClr val="dk1"/>
+                </a:solidFill>
+                <a:latin typeface="Century Gothic"/>
+                <a:ea typeface="Century Gothic"/>
+                <a:cs typeface="Century Gothic"/>
+                <a:sym typeface="Century Gothic"/>
+              </a:rPr>
+              <a:t>Prompts and the structure of the Prompts</a:t>
+            </a:r>
+            <a:endParaRPr sz="1400">
+              <a:solidFill>
+                <a:schemeClr val="dk1"/>
+              </a:solidFill>
+              <a:latin typeface="Century Gothic"/>
+              <a:ea typeface="Century Gothic"/>
+              <a:cs typeface="Century Gothic"/>
+              <a:sym typeface="Century Gothic"/>
+            </a:endParaRPr>
+          </a:p>
+          <a:p>
+            <a:pPr marL="457200" lvl="0" indent="-317500" algn="l" rtl="0">
+              <a:lnSpc>
+                <a:spcPct val="115000"/>
+              </a:lnSpc>
+              <a:spcBef>
+                <a:spcPts val="1000"/>
+              </a:spcBef>
+              <a:spcAft>
+                <a:spcPts val="0"/>
+              </a:spcAft>
+              <a:buClr>
+                <a:schemeClr val="dk1"/>
+              </a:buClr>
+              <a:buSzPts val="1400"/>
+              <a:buFont typeface="Century Gothic"/>
+              <a:buChar char="●"/>
+            </a:pPr>
+            <a:r>
+              <a:rPr lang="en" sz="1400">
+                <a:solidFill>
+                  <a:schemeClr val="dk1"/>
+                </a:solidFill>
+                <a:latin typeface="Century Gothic"/>
+                <a:ea typeface="Century Gothic"/>
+                <a:cs typeface="Century Gothic"/>
+                <a:sym typeface="Century Gothic"/>
+              </a:rPr>
+              <a:t>Output from the Prompts</a:t>
+            </a:r>
+            <a:endParaRPr sz="1400">
+              <a:solidFill>
+                <a:schemeClr val="dk1"/>
+              </a:solidFill>
+              <a:latin typeface="Century Gothic"/>
+              <a:ea typeface="Century Gothic"/>
+              <a:cs typeface="Century Gothic"/>
+              <a:sym typeface="Century Gothic"/>
+            </a:endParaRPr>
+          </a:p>
+          <a:p>
+            <a:pPr marL="457200" lvl="0" indent="-317500" algn="l" rtl="0">
+              <a:lnSpc>
+                <a:spcPct val="115000"/>
+              </a:lnSpc>
+              <a:spcBef>
+                <a:spcPts val="1000"/>
+              </a:spcBef>
+              <a:spcAft>
+                <a:spcPts val="0"/>
+              </a:spcAft>
+              <a:buClr>
+                <a:schemeClr val="dk1"/>
+              </a:buClr>
+              <a:buSzPts val="1400"/>
+              <a:buFont typeface="Century Gothic"/>
+              <a:buChar char="●"/>
+            </a:pPr>
+            <a:r>
+              <a:rPr lang="en" sz="1400">
+                <a:solidFill>
+                  <a:schemeClr val="dk1"/>
+                </a:solidFill>
+                <a:latin typeface="Century Gothic"/>
+                <a:ea typeface="Century Gothic"/>
+                <a:cs typeface="Century Gothic"/>
+                <a:sym typeface="Century Gothic"/>
+              </a:rPr>
+              <a:t>Observations/Insights and conclusions</a:t>
+            </a:r>
+            <a:endParaRPr sz="1400">
+              <a:solidFill>
+                <a:schemeClr val="dk1"/>
+              </a:solidFill>
+              <a:latin typeface="Century Gothic"/>
+              <a:ea typeface="Century Gothic"/>
+              <a:cs typeface="Century Gothic"/>
+              <a:sym typeface="Century Gothic"/>
+            </a:endParaRPr>
+          </a:p>
+          <a:p>
+            <a:pPr marL="457200" lvl="0" indent="-317500" algn="l" rtl="0">
+              <a:lnSpc>
+                <a:spcPct val="115000"/>
+              </a:lnSpc>
+              <a:spcBef>
+                <a:spcPts val="1000"/>
+              </a:spcBef>
+              <a:spcAft>
+                <a:spcPts val="1000"/>
+              </a:spcAft>
+              <a:buClr>
+                <a:schemeClr val="dk1"/>
+              </a:buClr>
+              <a:buSzPts val="1400"/>
+              <a:buFont typeface="Century Gothic"/>
+              <a:buChar char="●"/>
+            </a:pPr>
+            <a:r>
+              <a:rPr lang="en" sz="1400">
+                <a:solidFill>
+                  <a:schemeClr val="dk1"/>
+                </a:solidFill>
+                <a:latin typeface="Century Gothic"/>
+                <a:ea typeface="Century Gothic"/>
+                <a:cs typeface="Century Gothic"/>
+                <a:sym typeface="Century Gothic"/>
+              </a:rPr>
+              <a:t>Appendix</a:t>
+            </a:r>
+            <a:endParaRPr sz="1400">
+              <a:solidFill>
+                <a:schemeClr val="dk1"/>
+              </a:solidFill>
+              <a:latin typeface="Century Gothic"/>
+              <a:ea typeface="Century Gothic"/>
+              <a:cs typeface="Century Gothic"/>
+              <a:sym typeface="Century Gothic"/>
+            </a:endParaRPr>
+          </a:p>
+        </p:txBody>
+      </p:sp>
+    </p:spTree>
+  </p:cSld>
+  <p:clrMapOvr>
+    <a:masterClrMapping/>
+  </p:clrMapOvr>
+</p:sld>
+</file>
+
+<file path=ppt/slides/slide20.xml><?xml version="1.0" encoding="utf-8"?>
 <p:sld xmlns:a="http://schemas.openxmlformats.org/drawingml/2006/main" xmlns:r="http://schemas.openxmlformats.org/officeDocument/2006/relationships" xmlns:p="http://schemas.openxmlformats.org/presentationml/2006/main">
   <p:cSld>
     <p:spTree>
@@ -28414,7 +29512,7 @@
 </p:sld>
 </file>
 
-<file path=ppt/slides/slide19.xml><?xml version="1.0" encoding="utf-8"?>
+<file path=ppt/slides/slide21.xml><?xml version="1.0" encoding="utf-8"?>
 <p:sld xmlns:a="http://schemas.openxmlformats.org/drawingml/2006/main" xmlns:r="http://schemas.openxmlformats.org/officeDocument/2006/relationships" xmlns:p="http://schemas.openxmlformats.org/presentationml/2006/main">
   <p:cSld>
     <p:spTree>
@@ -28710,368 +29808,7 @@
 </p:sld>
 </file>
 
-<file path=ppt/slides/slide2.xml><?xml version="1.0" encoding="utf-8"?>
-<p:sld xmlns:a="http://schemas.openxmlformats.org/drawingml/2006/main" xmlns:r="http://schemas.openxmlformats.org/officeDocument/2006/relationships" xmlns:p="http://schemas.openxmlformats.org/presentationml/2006/main">
-  <p:cSld>
-    <p:spTree>
-      <p:nvGrpSpPr>
-        <p:cNvPr id="1" name="Shape 156"/>
-        <p:cNvGrpSpPr/>
-        <p:nvPr/>
-      </p:nvGrpSpPr>
-      <p:grpSpPr>
-        <a:xfrm>
-          <a:off x="0" y="0"/>
-          <a:ext cx="0" cy="0"/>
-          <a:chOff x="0" y="0"/>
-          <a:chExt cx="0" cy="0"/>
-        </a:xfrm>
-      </p:grpSpPr>
-      <p:sp>
-        <p:nvSpPr>
-          <p:cNvPr id="157" name="Google Shape;157;p36"/>
-          <p:cNvSpPr txBox="1">
-            <a:spLocks noGrp="1"/>
-          </p:cNvSpPr>
-          <p:nvPr>
-            <p:ph type="title"/>
-          </p:nvPr>
-        </p:nvSpPr>
-        <p:spPr>
-          <a:xfrm>
-            <a:off x="202550" y="289279"/>
-            <a:ext cx="8520600" cy="572700"/>
-          </a:xfrm>
-          <a:prstGeom prst="rect">
-            <a:avLst/>
-          </a:prstGeom>
-          <a:noFill/>
-          <a:ln>
-            <a:noFill/>
-          </a:ln>
-        </p:spPr>
-        <p:txBody>
-          <a:bodyPr spcFirstLastPara="1" wrap="square" lIns="91425" tIns="91425" rIns="91425" bIns="91425" anchor="t" anchorCtr="0">
-            <a:noAutofit/>
-          </a:bodyPr>
-          <a:lstStyle/>
-          <a:p>
-            <a:pPr marL="0" lvl="0" indent="0" algn="l" rtl="0">
-              <a:lnSpc>
-                <a:spcPct val="100000"/>
-              </a:lnSpc>
-              <a:spcBef>
-                <a:spcPts val="0"/>
-              </a:spcBef>
-              <a:spcAft>
-                <a:spcPts val="0"/>
-              </a:spcAft>
-              <a:buSzPts val="2200"/>
-              <a:buNone/>
-            </a:pPr>
-            <a:r>
-              <a:rPr lang="en">
-                <a:solidFill>
-                  <a:schemeClr val="lt2"/>
-                </a:solidFill>
-                <a:latin typeface="Century Gothic"/>
-                <a:ea typeface="Century Gothic"/>
-                <a:cs typeface="Century Gothic"/>
-                <a:sym typeface="Century Gothic"/>
-              </a:rPr>
-              <a:t>Contents / Agenda</a:t>
-            </a:r>
-            <a:endParaRPr>
-              <a:solidFill>
-                <a:schemeClr val="lt2"/>
-              </a:solidFill>
-              <a:latin typeface="Century Gothic"/>
-              <a:ea typeface="Century Gothic"/>
-              <a:cs typeface="Century Gothic"/>
-              <a:sym typeface="Century Gothic"/>
-            </a:endParaRPr>
-          </a:p>
-        </p:txBody>
-      </p:sp>
-      <p:sp>
-        <p:nvSpPr>
-          <p:cNvPr id="158" name="Google Shape;158;p36"/>
-          <p:cNvSpPr txBox="1">
-            <a:spLocks noGrp="1"/>
-          </p:cNvSpPr>
-          <p:nvPr>
-            <p:ph type="body" idx="1"/>
-          </p:nvPr>
-        </p:nvSpPr>
-        <p:spPr>
-          <a:xfrm>
-            <a:off x="202550" y="861975"/>
-            <a:ext cx="8629800" cy="3706800"/>
-          </a:xfrm>
-          <a:prstGeom prst="rect">
-            <a:avLst/>
-          </a:prstGeom>
-          <a:noFill/>
-          <a:ln>
-            <a:noFill/>
-          </a:ln>
-        </p:spPr>
-        <p:txBody>
-          <a:bodyPr spcFirstLastPara="1" wrap="square" lIns="91425" tIns="91425" rIns="91425" bIns="91425" anchor="t" anchorCtr="0">
-            <a:noAutofit/>
-          </a:bodyPr>
-          <a:lstStyle/>
-          <a:p>
-            <a:pPr marL="457200" lvl="0" indent="-317500" algn="l" rtl="0">
-              <a:lnSpc>
-                <a:spcPct val="115000"/>
-              </a:lnSpc>
-              <a:spcBef>
-                <a:spcPts val="1000"/>
-              </a:spcBef>
-              <a:spcAft>
-                <a:spcPts val="0"/>
-              </a:spcAft>
-              <a:buClr>
-                <a:schemeClr val="dk1"/>
-              </a:buClr>
-              <a:buSzPts val="1400"/>
-              <a:buFont typeface="Century Gothic"/>
-              <a:buChar char="●"/>
-            </a:pPr>
-            <a:r>
-              <a:rPr lang="en" sz="1400">
-                <a:solidFill>
-                  <a:schemeClr val="dk1"/>
-                </a:solidFill>
-                <a:latin typeface="Century Gothic"/>
-                <a:ea typeface="Century Gothic"/>
-                <a:cs typeface="Century Gothic"/>
-                <a:sym typeface="Century Gothic"/>
-              </a:rPr>
-              <a:t>Business Context, Problem Overview and Solution Approach</a:t>
-            </a:r>
-            <a:endParaRPr sz="1400">
-              <a:solidFill>
-                <a:schemeClr val="dk1"/>
-              </a:solidFill>
-              <a:latin typeface="Century Gothic"/>
-              <a:ea typeface="Century Gothic"/>
-              <a:cs typeface="Century Gothic"/>
-              <a:sym typeface="Century Gothic"/>
-            </a:endParaRPr>
-          </a:p>
-          <a:p>
-            <a:pPr marL="457200" lvl="0" indent="-317500" algn="l" rtl="0">
-              <a:lnSpc>
-                <a:spcPct val="115000"/>
-              </a:lnSpc>
-              <a:spcBef>
-                <a:spcPts val="1000"/>
-              </a:spcBef>
-              <a:spcAft>
-                <a:spcPts val="0"/>
-              </a:spcAft>
-              <a:buClr>
-                <a:schemeClr val="dk1"/>
-              </a:buClr>
-              <a:buSzPts val="1400"/>
-              <a:buFont typeface="Century Gothic"/>
-              <a:buChar char="●"/>
-            </a:pPr>
-            <a:r>
-              <a:rPr lang="en" sz="1400">
-                <a:solidFill>
-                  <a:schemeClr val="dk1"/>
-                </a:solidFill>
-                <a:latin typeface="Century Gothic"/>
-                <a:ea typeface="Century Gothic"/>
-                <a:cs typeface="Century Gothic"/>
-                <a:sym typeface="Century Gothic"/>
-              </a:rPr>
-              <a:t>Exploring Different Prompting Techniques</a:t>
-            </a:r>
-            <a:endParaRPr sz="1400">
-              <a:solidFill>
-                <a:schemeClr val="dk1"/>
-              </a:solidFill>
-              <a:latin typeface="Century Gothic"/>
-              <a:ea typeface="Century Gothic"/>
-              <a:cs typeface="Century Gothic"/>
-              <a:sym typeface="Century Gothic"/>
-            </a:endParaRPr>
-          </a:p>
-          <a:p>
-            <a:pPr marL="457200" lvl="0" indent="-317500" algn="l" rtl="0">
-              <a:lnSpc>
-                <a:spcPct val="115000"/>
-              </a:lnSpc>
-              <a:spcBef>
-                <a:spcPts val="1000"/>
-              </a:spcBef>
-              <a:spcAft>
-                <a:spcPts val="0"/>
-              </a:spcAft>
-              <a:buClr>
-                <a:schemeClr val="dk1"/>
-              </a:buClr>
-              <a:buSzPts val="1400"/>
-              <a:buFont typeface="Century Gothic"/>
-              <a:buChar char="●"/>
-            </a:pPr>
-            <a:r>
-              <a:rPr lang="en" sz="1400">
-                <a:solidFill>
-                  <a:schemeClr val="dk1"/>
-                </a:solidFill>
-                <a:latin typeface="Century Gothic"/>
-                <a:ea typeface="Century Gothic"/>
-                <a:cs typeface="Century Gothic"/>
-                <a:sym typeface="Century Gothic"/>
-              </a:rPr>
-              <a:t>Prompts and the structure of the Prompts</a:t>
-            </a:r>
-            <a:endParaRPr sz="1400">
-              <a:solidFill>
-                <a:schemeClr val="dk1"/>
-              </a:solidFill>
-              <a:latin typeface="Century Gothic"/>
-              <a:ea typeface="Century Gothic"/>
-              <a:cs typeface="Century Gothic"/>
-              <a:sym typeface="Century Gothic"/>
-            </a:endParaRPr>
-          </a:p>
-          <a:p>
-            <a:pPr marL="457200" lvl="0" indent="-317500" algn="l" rtl="0">
-              <a:lnSpc>
-                <a:spcPct val="115000"/>
-              </a:lnSpc>
-              <a:spcBef>
-                <a:spcPts val="1000"/>
-              </a:spcBef>
-              <a:spcAft>
-                <a:spcPts val="0"/>
-              </a:spcAft>
-              <a:buClr>
-                <a:schemeClr val="dk1"/>
-              </a:buClr>
-              <a:buSzPts val="1400"/>
-              <a:buFont typeface="Century Gothic"/>
-              <a:buChar char="●"/>
-            </a:pPr>
-            <a:r>
-              <a:rPr lang="en" sz="1400">
-                <a:solidFill>
-                  <a:schemeClr val="dk1"/>
-                </a:solidFill>
-                <a:latin typeface="Century Gothic"/>
-                <a:ea typeface="Century Gothic"/>
-                <a:cs typeface="Century Gothic"/>
-                <a:sym typeface="Century Gothic"/>
-              </a:rPr>
-              <a:t>Output from the Prompts</a:t>
-            </a:r>
-            <a:endParaRPr sz="1400">
-              <a:solidFill>
-                <a:schemeClr val="dk1"/>
-              </a:solidFill>
-              <a:latin typeface="Century Gothic"/>
-              <a:ea typeface="Century Gothic"/>
-              <a:cs typeface="Century Gothic"/>
-              <a:sym typeface="Century Gothic"/>
-            </a:endParaRPr>
-          </a:p>
-          <a:p>
-            <a:pPr marL="457200" lvl="0" indent="-317500" algn="l" rtl="0">
-              <a:lnSpc>
-                <a:spcPct val="115000"/>
-              </a:lnSpc>
-              <a:spcBef>
-                <a:spcPts val="1000"/>
-              </a:spcBef>
-              <a:spcAft>
-                <a:spcPts val="0"/>
-              </a:spcAft>
-              <a:buClr>
-                <a:schemeClr val="dk1"/>
-              </a:buClr>
-              <a:buSzPts val="1400"/>
-              <a:buFont typeface="Century Gothic"/>
-              <a:buChar char="●"/>
-            </a:pPr>
-            <a:r>
-              <a:rPr lang="en" sz="1400">
-                <a:solidFill>
-                  <a:schemeClr val="dk1"/>
-                </a:solidFill>
-                <a:latin typeface="Century Gothic"/>
-                <a:ea typeface="Century Gothic"/>
-                <a:cs typeface="Century Gothic"/>
-                <a:sym typeface="Century Gothic"/>
-              </a:rPr>
-              <a:t>Observations/Insights and conclusions</a:t>
-            </a:r>
-            <a:endParaRPr sz="1400">
-              <a:solidFill>
-                <a:schemeClr val="dk1"/>
-              </a:solidFill>
-              <a:latin typeface="Century Gothic"/>
-              <a:ea typeface="Century Gothic"/>
-              <a:cs typeface="Century Gothic"/>
-              <a:sym typeface="Century Gothic"/>
-            </a:endParaRPr>
-          </a:p>
-          <a:p>
-            <a:pPr marL="457200" lvl="0" indent="-317500" algn="l" rtl="0">
-              <a:lnSpc>
-                <a:spcPct val="115000"/>
-              </a:lnSpc>
-              <a:spcBef>
-                <a:spcPts val="1000"/>
-              </a:spcBef>
-              <a:spcAft>
-                <a:spcPts val="1000"/>
-              </a:spcAft>
-              <a:buClr>
-                <a:schemeClr val="dk1"/>
-              </a:buClr>
-              <a:buSzPts val="1400"/>
-              <a:buFont typeface="Century Gothic"/>
-              <a:buChar char="●"/>
-            </a:pPr>
-            <a:r>
-              <a:rPr lang="en" sz="1400">
-                <a:solidFill>
-                  <a:schemeClr val="dk1"/>
-                </a:solidFill>
-                <a:latin typeface="Century Gothic"/>
-                <a:ea typeface="Century Gothic"/>
-                <a:cs typeface="Century Gothic"/>
-                <a:sym typeface="Century Gothic"/>
-              </a:rPr>
-              <a:t>Appendix</a:t>
-            </a:r>
-            <a:endParaRPr sz="1400">
-              <a:solidFill>
-                <a:schemeClr val="dk1"/>
-              </a:solidFill>
-              <a:latin typeface="Century Gothic"/>
-              <a:ea typeface="Century Gothic"/>
-              <a:cs typeface="Century Gothic"/>
-              <a:sym typeface="Century Gothic"/>
-            </a:endParaRPr>
-          </a:p>
-        </p:txBody>
-      </p:sp>
-    </p:spTree>
-  </p:cSld>
-  <p:clrMapOvr>
-    <a:masterClrMapping/>
-  </p:clrMapOvr>
-</p:sld>
-</file>
-
-<file path=ppt/slides/slide20.xml><?xml version="1.0" encoding="utf-8"?>
+<file path=ppt/slides/slide22.xml><?xml version="1.0" encoding="utf-8"?>
 <p:sld xmlns:a="http://schemas.openxmlformats.org/drawingml/2006/main" xmlns:r="http://schemas.openxmlformats.org/officeDocument/2006/relationships" xmlns:p="http://schemas.openxmlformats.org/presentationml/2006/main">
   <p:cSld>
     <p:spTree>
@@ -29446,7 +30183,7 @@
 </p:sld>
 </file>
 
-<file path=ppt/slides/slide21.xml><?xml version="1.0" encoding="utf-8"?>
+<file path=ppt/slides/slide23.xml><?xml version="1.0" encoding="utf-8"?>
 <p:sld xmlns:a="http://schemas.openxmlformats.org/drawingml/2006/main" xmlns:r="http://schemas.openxmlformats.org/officeDocument/2006/relationships" xmlns:p="http://schemas.openxmlformats.org/presentationml/2006/main">
   <p:cSld>
     <p:spTree>
@@ -29850,7 +30587,7 @@
 </p:sld>
 </file>
 
-<file path=ppt/slides/slide22.xml><?xml version="1.0" encoding="utf-8"?>
+<file path=ppt/slides/slide24.xml><?xml version="1.0" encoding="utf-8"?>
 <p:sld xmlns:a="http://schemas.openxmlformats.org/drawingml/2006/main" xmlns:r="http://schemas.openxmlformats.org/officeDocument/2006/relationships" xmlns:p="http://schemas.openxmlformats.org/presentationml/2006/main">
   <p:cSld>
     <p:spTree>
@@ -30254,7 +30991,7 @@
 </p:sld>
 </file>
 
-<file path=ppt/slides/slide23.xml><?xml version="1.0" encoding="utf-8"?>
+<file path=ppt/slides/slide25.xml><?xml version="1.0" encoding="utf-8"?>
 <p:sld xmlns:a="http://schemas.openxmlformats.org/drawingml/2006/main" xmlns:r="http://schemas.openxmlformats.org/officeDocument/2006/relationships" xmlns:p="http://schemas.openxmlformats.org/presentationml/2006/main">
   <p:cSld>
     <p:spTree>
@@ -30658,7 +31395,7 @@
 </p:sld>
 </file>
 
-<file path=ppt/slides/slide24.xml><?xml version="1.0" encoding="utf-8"?>
+<file path=ppt/slides/slide26.xml><?xml version="1.0" encoding="utf-8"?>
 <p:sld xmlns:a="http://schemas.openxmlformats.org/drawingml/2006/main" xmlns:r="http://schemas.openxmlformats.org/officeDocument/2006/relationships" xmlns:p="http://schemas.openxmlformats.org/presentationml/2006/main">
   <p:cSld>
     <p:spTree>
@@ -31009,7 +31746,7 @@
 </p:sld>
 </file>
 
-<file path=ppt/slides/slide25.xml><?xml version="1.0" encoding="utf-8"?>
+<file path=ppt/slides/slide27.xml><?xml version="1.0" encoding="utf-8"?>
 <p:sld xmlns:a="http://schemas.openxmlformats.org/drawingml/2006/main" xmlns:r="http://schemas.openxmlformats.org/officeDocument/2006/relationships" xmlns:p="http://schemas.openxmlformats.org/presentationml/2006/main">
   <p:cSld>
     <p:spTree>
@@ -31102,7 +31839,7 @@
 </p:sld>
 </file>
 
-<file path=ppt/slides/slide26.xml><?xml version="1.0" encoding="utf-8"?>
+<file path=ppt/slides/slide28.xml><?xml version="1.0" encoding="utf-8"?>
 <p:sld xmlns:a="http://schemas.openxmlformats.org/drawingml/2006/main" xmlns:r="http://schemas.openxmlformats.org/officeDocument/2006/relationships" xmlns:p="http://schemas.openxmlformats.org/presentationml/2006/main">
   <p:cSld>
     <p:spTree>
@@ -31263,7 +32000,7 @@
 </p:sld>
 </file>
 
-<file path=ppt/slides/slide27.xml><?xml version="1.0" encoding="utf-8"?>
+<file path=ppt/slides/slide29.xml><?xml version="1.0" encoding="utf-8"?>
 <p:sld xmlns:a="http://schemas.openxmlformats.org/drawingml/2006/main" xmlns:r="http://schemas.openxmlformats.org/officeDocument/2006/relationships" xmlns:p="http://schemas.openxmlformats.org/presentationml/2006/main">
   <p:cSld>
     <p:spTree>
@@ -31413,127 +32150,6 @@
               <a:cs typeface="Century Gothic"/>
               <a:sym typeface="Century Gothic"/>
             </a:endParaRPr>
-          </a:p>
-        </p:txBody>
-      </p:sp>
-    </p:spTree>
-  </p:cSld>
-  <p:clrMapOvr>
-    <a:masterClrMapping/>
-  </p:clrMapOvr>
-</p:sld>
-</file>
-
-<file path=ppt/slides/slide28.xml><?xml version="1.0" encoding="utf-8"?>
-<p:sld xmlns:a="http://schemas.openxmlformats.org/drawingml/2006/main" xmlns:r="http://schemas.openxmlformats.org/officeDocument/2006/relationships" xmlns:p="http://schemas.openxmlformats.org/presentationml/2006/main">
-  <p:cSld>
-    <p:spTree>
-      <p:nvGrpSpPr>
-        <p:cNvPr id="1" name="Shape 213"/>
-        <p:cNvGrpSpPr/>
-        <p:nvPr/>
-      </p:nvGrpSpPr>
-      <p:grpSpPr>
-        <a:xfrm>
-          <a:off x="0" y="0"/>
-          <a:ext cx="0" cy="0"/>
-          <a:chOff x="0" y="0"/>
-          <a:chExt cx="0" cy="0"/>
-        </a:xfrm>
-      </p:grpSpPr>
-      <p:sp>
-        <p:nvSpPr>
-          <p:cNvPr id="214" name="Google Shape;214;p45"/>
-          <p:cNvSpPr txBox="1">
-            <a:spLocks noGrp="1"/>
-          </p:cNvSpPr>
-          <p:nvPr>
-            <p:ph type="title"/>
-          </p:nvPr>
-        </p:nvSpPr>
-        <p:spPr>
-          <a:xfrm>
-            <a:off x="70129" y="6703219"/>
-            <a:ext cx="15008700" cy="697800"/>
-          </a:xfrm>
-          <a:prstGeom prst="rect">
-            <a:avLst/>
-          </a:prstGeom>
-          <a:noFill/>
-          <a:ln>
-            <a:noFill/>
-          </a:ln>
-        </p:spPr>
-        <p:txBody>
-          <a:bodyPr spcFirstLastPara="1" wrap="square" lIns="0" tIns="12850" rIns="0" bIns="0" anchor="t" anchorCtr="0">
-            <a:noAutofit/>
-          </a:bodyPr>
-          <a:lstStyle/>
-          <a:p>
-            <a:pPr marL="0" lvl="0" indent="0" algn="l" rtl="0">
-              <a:lnSpc>
-                <a:spcPct val="100000"/>
-              </a:lnSpc>
-              <a:spcBef>
-                <a:spcPts val="0"/>
-              </a:spcBef>
-              <a:spcAft>
-                <a:spcPts val="0"/>
-              </a:spcAft>
-              <a:buSzPts val="2200"/>
-              <a:buNone/>
-            </a:pPr>
-            <a:endParaRPr/>
-          </a:p>
-        </p:txBody>
-      </p:sp>
-      <p:sp>
-        <p:nvSpPr>
-          <p:cNvPr id="215" name="Google Shape;215;p45"/>
-          <p:cNvSpPr txBox="1">
-            <a:spLocks noGrp="1"/>
-          </p:cNvSpPr>
-          <p:nvPr>
-            <p:ph type="sldNum" idx="4294967295"/>
-          </p:nvPr>
-        </p:nvSpPr>
-        <p:spPr>
-          <a:xfrm>
-            <a:off x="8556784" y="4749851"/>
-            <a:ext cx="548700" cy="393600"/>
-          </a:xfrm>
-          <a:prstGeom prst="rect">
-            <a:avLst/>
-          </a:prstGeom>
-          <a:noFill/>
-          <a:ln>
-            <a:noFill/>
-          </a:ln>
-        </p:spPr>
-        <p:txBody>
-          <a:bodyPr spcFirstLastPara="1" wrap="square" lIns="91425" tIns="91425" rIns="91425" bIns="91425" anchor="ctr" anchorCtr="0">
-            <a:noAutofit/>
-          </a:bodyPr>
-          <a:lstStyle/>
-          <a:p>
-            <a:pPr marL="0" lvl="0" indent="0" algn="ctr" rtl="0">
-              <a:lnSpc>
-                <a:spcPct val="100000"/>
-              </a:lnSpc>
-              <a:spcBef>
-                <a:spcPts val="0"/>
-              </a:spcBef>
-              <a:spcAft>
-                <a:spcPts val="0"/>
-              </a:spcAft>
-              <a:buSzPts val="800"/>
-              <a:buNone/>
-            </a:pPr>
-            <a:fld id="{00000000-1234-1234-1234-123412341234}" type="slidenum">
-              <a:rPr lang="en"/>
-              <a:t>28</a:t>
-            </a:fld>
-            <a:endParaRPr/>
           </a:p>
         </p:txBody>
       </p:sp>
@@ -31734,6 +32350,127 @@
               <a:t>Automate sentiment classification of customer feedback for a food delivery platform using Generative AI and Prompt Engineering. Process customer reviews into Positive, Negative, or Neutral categories while ensuring factual consistency and interpretability. Map outputs with relevant tags (Delivery Time, Food Quality, Price, Packaging, Overall Experience) and suggested business actions.</a:t>
             </a:r>
             <a:endParaRPr lang="en-US" sz="1400" b="1" dirty="0"/>
+          </a:p>
+        </p:txBody>
+      </p:sp>
+    </p:spTree>
+  </p:cSld>
+  <p:clrMapOvr>
+    <a:masterClrMapping/>
+  </p:clrMapOvr>
+</p:sld>
+</file>
+
+<file path=ppt/slides/slide30.xml><?xml version="1.0" encoding="utf-8"?>
+<p:sld xmlns:a="http://schemas.openxmlformats.org/drawingml/2006/main" xmlns:r="http://schemas.openxmlformats.org/officeDocument/2006/relationships" xmlns:p="http://schemas.openxmlformats.org/presentationml/2006/main">
+  <p:cSld>
+    <p:spTree>
+      <p:nvGrpSpPr>
+        <p:cNvPr id="1" name="Shape 213"/>
+        <p:cNvGrpSpPr/>
+        <p:nvPr/>
+      </p:nvGrpSpPr>
+      <p:grpSpPr>
+        <a:xfrm>
+          <a:off x="0" y="0"/>
+          <a:ext cx="0" cy="0"/>
+          <a:chOff x="0" y="0"/>
+          <a:chExt cx="0" cy="0"/>
+        </a:xfrm>
+      </p:grpSpPr>
+      <p:sp>
+        <p:nvSpPr>
+          <p:cNvPr id="214" name="Google Shape;214;p45"/>
+          <p:cNvSpPr txBox="1">
+            <a:spLocks noGrp="1"/>
+          </p:cNvSpPr>
+          <p:nvPr>
+            <p:ph type="title"/>
+          </p:nvPr>
+        </p:nvSpPr>
+        <p:spPr>
+          <a:xfrm>
+            <a:off x="70129" y="6703219"/>
+            <a:ext cx="15008700" cy="697800"/>
+          </a:xfrm>
+          <a:prstGeom prst="rect">
+            <a:avLst/>
+          </a:prstGeom>
+          <a:noFill/>
+          <a:ln>
+            <a:noFill/>
+          </a:ln>
+        </p:spPr>
+        <p:txBody>
+          <a:bodyPr spcFirstLastPara="1" wrap="square" lIns="0" tIns="12850" rIns="0" bIns="0" anchor="t" anchorCtr="0">
+            <a:noAutofit/>
+          </a:bodyPr>
+          <a:lstStyle/>
+          <a:p>
+            <a:pPr marL="0" lvl="0" indent="0" algn="l" rtl="0">
+              <a:lnSpc>
+                <a:spcPct val="100000"/>
+              </a:lnSpc>
+              <a:spcBef>
+                <a:spcPts val="0"/>
+              </a:spcBef>
+              <a:spcAft>
+                <a:spcPts val="0"/>
+              </a:spcAft>
+              <a:buSzPts val="2200"/>
+              <a:buNone/>
+            </a:pPr>
+            <a:endParaRPr/>
+          </a:p>
+        </p:txBody>
+      </p:sp>
+      <p:sp>
+        <p:nvSpPr>
+          <p:cNvPr id="215" name="Google Shape;215;p45"/>
+          <p:cNvSpPr txBox="1">
+            <a:spLocks noGrp="1"/>
+          </p:cNvSpPr>
+          <p:nvPr>
+            <p:ph type="sldNum" idx="4294967295"/>
+          </p:nvPr>
+        </p:nvSpPr>
+        <p:spPr>
+          <a:xfrm>
+            <a:off x="8556784" y="4749851"/>
+            <a:ext cx="548700" cy="393600"/>
+          </a:xfrm>
+          <a:prstGeom prst="rect">
+            <a:avLst/>
+          </a:prstGeom>
+          <a:noFill/>
+          <a:ln>
+            <a:noFill/>
+          </a:ln>
+        </p:spPr>
+        <p:txBody>
+          <a:bodyPr spcFirstLastPara="1" wrap="square" lIns="91425" tIns="91425" rIns="91425" bIns="91425" anchor="ctr" anchorCtr="0">
+            <a:noAutofit/>
+          </a:bodyPr>
+          <a:lstStyle/>
+          <a:p>
+            <a:pPr marL="0" lvl="0" indent="0" algn="ctr" rtl="0">
+              <a:lnSpc>
+                <a:spcPct val="100000"/>
+              </a:lnSpc>
+              <a:spcBef>
+                <a:spcPts val="0"/>
+              </a:spcBef>
+              <a:spcAft>
+                <a:spcPts val="0"/>
+              </a:spcAft>
+              <a:buSzPts val="800"/>
+              <a:buNone/>
+            </a:pPr>
+            <a:fld id="{00000000-1234-1234-1234-123412341234}" type="slidenum">
+              <a:rPr lang="en"/>
+              <a:t>30</a:t>
+            </a:fld>
+            <a:endParaRPr/>
           </a:p>
         </p:txBody>
       </p:sp>
@@ -33461,15 +34198,7 @@
             </a:pPr>
             <a:r>
               <a:rPr lang="en-US" dirty="0"/>
-              <a:t>Increase scalability (process </a:t>
-            </a:r>
-            <a:r>
-              <a:rPr lang="en-US"/>
-              <a:t>more reviews) </a:t>
-            </a:r>
-            <a:r>
-              <a:rPr lang="en-US" dirty="0"/>
-              <a:t>while keeping costs low</a:t>
+              <a:t>Increase scalability (process more reviews) while keeping costs low</a:t>
             </a:r>
           </a:p>
           <a:p>
@@ -33629,8 +34358,8 @@
         </p:nvSpPr>
         <p:spPr>
           <a:xfrm>
-            <a:off x="339152" y="2860770"/>
-            <a:ext cx="8629800" cy="2190313"/>
+            <a:off x="359777" y="3233319"/>
+            <a:ext cx="8629800" cy="1647087"/>
           </a:xfrm>
           <a:prstGeom prst="rect">
             <a:avLst/>
@@ -33671,6 +34400,42 @@
             </a:endParaRPr>
           </a:p>
           <a:p>
+            <a:pPr marL="139700" indent="0" algn="just">
+              <a:spcBef>
+                <a:spcPts val="600"/>
+              </a:spcBef>
+              <a:buClr>
+                <a:schemeClr val="dk1"/>
+              </a:buClr>
+              <a:buSzPts val="1400"/>
+              <a:buNone/>
+            </a:pPr>
+            <a:r>
+              <a:rPr lang="en-US" sz="1100" b="1" dirty="0">
+                <a:solidFill>
+                  <a:schemeClr val="dk1"/>
+                </a:solidFill>
+                <a:latin typeface="Century Gothic"/>
+                <a:ea typeface="Century Gothic"/>
+                <a:cs typeface="Century Gothic"/>
+                <a:sym typeface="Century Gothic"/>
+              </a:rPr>
+              <a:t>Data Shape </a:t>
+            </a:r>
+            <a:r>
+              <a:rPr lang="en-US" sz="1100" dirty="0">
+                <a:solidFill>
+                  <a:schemeClr val="dk1"/>
+                </a:solidFill>
+                <a:latin typeface="Century Gothic"/>
+                <a:ea typeface="Century Gothic"/>
+                <a:cs typeface="Century Gothic"/>
+                <a:sym typeface="Century Gothic"/>
+              </a:rPr>
+              <a:t>— 4 columns, 100 rows of data</a:t>
+            </a:r>
+          </a:p>
+          <a:p>
             <a:pPr marL="139700" lvl="0" indent="0" algn="just">
               <a:spcBef>
                 <a:spcPts val="600"/>
@@ -33703,31 +34468,7 @@
                 <a:cs typeface="Century Gothic"/>
                 <a:sym typeface="Century Gothic"/>
               </a:rPr>
-              <a:t>— There are a lot of missing values (</a:t>
-            </a:r>
-            <a:r>
-              <a:rPr lang="en-US" sz="1100" b="1" dirty="0">
-                <a:solidFill>
-                  <a:schemeClr val="dk1"/>
-                </a:solidFill>
-                <a:latin typeface="Century Gothic"/>
-                <a:ea typeface="Century Gothic"/>
-                <a:cs typeface="Century Gothic"/>
-                <a:sym typeface="Century Gothic"/>
-              </a:rPr>
-              <a:t>DEBTINC</a:t>
-            </a:r>
-            <a:r>
-              <a:rPr lang="en-US" sz="1100" dirty="0">
-                <a:solidFill>
-                  <a:schemeClr val="dk1"/>
-                </a:solidFill>
-                <a:latin typeface="Century Gothic"/>
-                <a:ea typeface="Century Gothic"/>
-                <a:cs typeface="Century Gothic"/>
-                <a:sym typeface="Century Gothic"/>
-              </a:rPr>
-              <a:t> has 4,693 vs 5,960 total records); imputation needed</a:t>
+              <a:t>— There are no missing values, imputation is not required</a:t>
             </a:r>
           </a:p>
           <a:p>
@@ -33766,7 +34507,7 @@
               <a:t> — </a:t>
             </a:r>
             <a:r>
-              <a:rPr lang="en-US" sz="1100" b="1" dirty="0">
+              <a:rPr lang="en-US" sz="1100" b="1" dirty="0" err="1">
                 <a:solidFill>
                   <a:schemeClr val="dk1"/>
                 </a:solidFill>
@@ -33775,10 +34516,10 @@
                 <a:cs typeface="Century Gothic"/>
                 <a:sym typeface="Century Gothic"/>
               </a:rPr>
-              <a:t>VALUE</a:t>
+              <a:t>Delivery_Times</a:t>
             </a:r>
             <a:r>
-              <a:rPr lang="en-US" sz="1100" dirty="0">
+              <a:rPr lang="en-US" sz="1100" b="1" dirty="0">
                 <a:solidFill>
                   <a:schemeClr val="dk1"/>
                 </a:solidFill>
@@ -33787,10 +34528,10 @@
                 <a:cs typeface="Century Gothic"/>
                 <a:sym typeface="Century Gothic"/>
               </a:rPr>
-              <a:t> and </a:t>
+              <a:t> </a:t>
             </a:r>
             <a:r>
-              <a:rPr lang="en-US" sz="1100" b="1" dirty="0">
+              <a:rPr lang="en-US" sz="1100" dirty="0">
                 <a:solidFill>
                   <a:schemeClr val="dk1"/>
                 </a:solidFill>
@@ -33799,10 +34540,10 @@
                 <a:cs typeface="Century Gothic"/>
                 <a:sym typeface="Century Gothic"/>
               </a:rPr>
-              <a:t>MORTDUE</a:t>
+              <a:t>range from </a:t>
             </a:r>
             <a:r>
-              <a:rPr lang="en-US" sz="1100" dirty="0">
+              <a:rPr lang="en-US" sz="1100" b="1" dirty="0">
                 <a:solidFill>
                   <a:schemeClr val="dk1"/>
                 </a:solidFill>
@@ -33811,32 +34552,33 @@
                 <a:cs typeface="Century Gothic"/>
                 <a:sym typeface="Century Gothic"/>
               </a:rPr>
-              <a:t> have large standard deviations (</a:t>
+              <a:t>22 </a:t>
             </a:r>
             <a:r>
-              <a:rPr lang="en-US" sz="1100" b="1" dirty="0">
-                <a:solidFill>
-                  <a:schemeClr val="dk1"/>
-                </a:solidFill>
-                <a:latin typeface="Century Gothic"/>
-                <a:ea typeface="Century Gothic"/>
-                <a:cs typeface="Century Gothic"/>
-                <a:sym typeface="Century Gothic"/>
-              </a:rPr>
-              <a:t>STD</a:t>
+              <a:rPr lang="en-US" sz="1100" b="1" dirty="0"/>
+              <a:t>→ 98</a:t>
             </a:r>
             <a:r>
-              <a:rPr lang="en-US" sz="1100" dirty="0">
-                <a:solidFill>
-                  <a:schemeClr val="dk1"/>
-                </a:solidFill>
-                <a:latin typeface="Century Gothic"/>
-                <a:ea typeface="Century Gothic"/>
-                <a:cs typeface="Century Gothic"/>
-                <a:sym typeface="Century Gothic"/>
-              </a:rPr>
-              <a:t>) relative to means</a:t>
+              <a:rPr lang="en-US" sz="1100" dirty="0"/>
+              <a:t> minutes, with a mean of </a:t>
             </a:r>
+            <a:r>
+              <a:rPr lang="en-US" sz="1100" b="1" dirty="0"/>
+              <a:t>≈ 49</a:t>
+            </a:r>
+            <a:r>
+              <a:rPr lang="en-US" sz="1100" dirty="0"/>
+              <a:t> minutes</a:t>
+            </a:r>
+            <a:endParaRPr lang="en-US" sz="1100" dirty="0">
+              <a:solidFill>
+                <a:schemeClr val="dk1"/>
+              </a:solidFill>
+              <a:latin typeface="Century Gothic"/>
+              <a:ea typeface="Century Gothic"/>
+              <a:cs typeface="Century Gothic"/>
+              <a:sym typeface="Century Gothic"/>
+            </a:endParaRPr>
           </a:p>
           <a:p>
             <a:pPr marL="139700" lvl="0" indent="0" algn="just">
@@ -33871,245 +34613,8 @@
                 <a:cs typeface="Century Gothic"/>
                 <a:sym typeface="Century Gothic"/>
               </a:rPr>
-              <a:t> — </a:t>
+              <a:t> — There do not appear to be any outliers</a:t>
             </a:r>
-            <a:r>
-              <a:rPr lang="en-US" sz="1100" b="1" dirty="0">
-                <a:solidFill>
-                  <a:schemeClr val="dk1"/>
-                </a:solidFill>
-                <a:latin typeface="Century Gothic"/>
-                <a:ea typeface="Century Gothic"/>
-                <a:cs typeface="Century Gothic"/>
-                <a:sym typeface="Century Gothic"/>
-              </a:rPr>
-              <a:t>CLAGE</a:t>
-            </a:r>
-            <a:r>
-              <a:rPr lang="en-US" sz="1100" dirty="0">
-                <a:solidFill>
-                  <a:schemeClr val="dk1"/>
-                </a:solidFill>
-                <a:latin typeface="Century Gothic"/>
-                <a:ea typeface="Century Gothic"/>
-                <a:cs typeface="Century Gothic"/>
-                <a:sym typeface="Century Gothic"/>
-              </a:rPr>
-              <a:t> max of 1,168 months (~97 years), </a:t>
-            </a:r>
-            <a:r>
-              <a:rPr lang="en-US" sz="1100" b="1" dirty="0">
-                <a:solidFill>
-                  <a:schemeClr val="dk1"/>
-                </a:solidFill>
-                <a:latin typeface="Century Gothic"/>
-                <a:ea typeface="Century Gothic"/>
-                <a:cs typeface="Century Gothic"/>
-                <a:sym typeface="Century Gothic"/>
-              </a:rPr>
-              <a:t>DEBTINC</a:t>
-            </a:r>
-            <a:r>
-              <a:rPr lang="en-US" sz="1100" dirty="0">
-                <a:solidFill>
-                  <a:schemeClr val="dk1"/>
-                </a:solidFill>
-                <a:latin typeface="Century Gothic"/>
-                <a:ea typeface="Century Gothic"/>
-                <a:cs typeface="Century Gothic"/>
-                <a:sym typeface="Century Gothic"/>
-              </a:rPr>
-              <a:t> max of 203% seem extreme</a:t>
-            </a:r>
-          </a:p>
-          <a:p>
-            <a:pPr marL="139700" lvl="0" indent="0" algn="just">
-              <a:spcBef>
-                <a:spcPts val="600"/>
-              </a:spcBef>
-              <a:buClr>
-                <a:schemeClr val="dk1"/>
-              </a:buClr>
-              <a:buSzPts val="1400"/>
-              <a:buNone/>
-            </a:pPr>
-            <a:r>
-              <a:rPr lang="en-US" sz="1100" b="1" dirty="0">
-                <a:solidFill>
-                  <a:schemeClr val="dk1"/>
-                </a:solidFill>
-                <a:latin typeface="Century Gothic"/>
-                <a:ea typeface="Century Gothic"/>
-                <a:cs typeface="Century Gothic"/>
-                <a:sym typeface="Century Gothic"/>
-              </a:rPr>
-              <a:t>Skewed distributions</a:t>
-            </a:r>
-            <a:r>
-              <a:rPr lang="en-US" sz="1100" dirty="0">
-                <a:solidFill>
-                  <a:schemeClr val="dk1"/>
-                </a:solidFill>
-                <a:latin typeface="Century Gothic"/>
-                <a:ea typeface="Century Gothic"/>
-                <a:cs typeface="Century Gothic"/>
-                <a:sym typeface="Century Gothic"/>
-              </a:rPr>
-              <a:t> — Several features show large gaps between 75% and max (</a:t>
-            </a:r>
-            <a:r>
-              <a:rPr lang="en-US" sz="1100" b="1" dirty="0">
-                <a:solidFill>
-                  <a:schemeClr val="dk1"/>
-                </a:solidFill>
-                <a:latin typeface="Century Gothic"/>
-                <a:ea typeface="Century Gothic"/>
-                <a:cs typeface="Century Gothic"/>
-                <a:sym typeface="Century Gothic"/>
-              </a:rPr>
-              <a:t>LOAN, VALUE, MORTDUE</a:t>
-            </a:r>
-            <a:r>
-              <a:rPr lang="en-US" sz="1100" dirty="0">
-                <a:solidFill>
-                  <a:schemeClr val="dk1"/>
-                </a:solidFill>
-                <a:latin typeface="Century Gothic"/>
-                <a:ea typeface="Century Gothic"/>
-                <a:cs typeface="Century Gothic"/>
-                <a:sym typeface="Century Gothic"/>
-              </a:rPr>
-              <a:t>)</a:t>
-            </a:r>
-          </a:p>
-          <a:p>
-            <a:pPr marL="139700" lvl="0" indent="0" algn="just">
-              <a:spcBef>
-                <a:spcPts val="600"/>
-              </a:spcBef>
-              <a:buClr>
-                <a:schemeClr val="dk1"/>
-              </a:buClr>
-              <a:buSzPts val="1400"/>
-              <a:buNone/>
-            </a:pPr>
-            <a:r>
-              <a:rPr lang="en-US" sz="1100" b="1" dirty="0">
-                <a:solidFill>
-                  <a:schemeClr val="dk1"/>
-                </a:solidFill>
-                <a:latin typeface="Century Gothic"/>
-                <a:ea typeface="Century Gothic"/>
-                <a:cs typeface="Century Gothic"/>
-                <a:sym typeface="Century Gothic"/>
-              </a:rPr>
-              <a:t>Categorical features </a:t>
-            </a:r>
-            <a:r>
-              <a:rPr lang="en-US" sz="1100" dirty="0">
-                <a:solidFill>
-                  <a:schemeClr val="dk1"/>
-                </a:solidFill>
-                <a:latin typeface="Century Gothic"/>
-                <a:ea typeface="Century Gothic"/>
-                <a:cs typeface="Century Gothic"/>
-                <a:sym typeface="Century Gothic"/>
-              </a:rPr>
-              <a:t>— </a:t>
-            </a:r>
-            <a:r>
-              <a:rPr lang="en-US" sz="1100" b="1" dirty="0">
-                <a:solidFill>
-                  <a:schemeClr val="dk1"/>
-                </a:solidFill>
-                <a:latin typeface="Century Gothic"/>
-                <a:ea typeface="Century Gothic"/>
-                <a:cs typeface="Century Gothic"/>
-                <a:sym typeface="Century Gothic"/>
-              </a:rPr>
-              <a:t>REASON</a:t>
-            </a:r>
-            <a:r>
-              <a:rPr lang="en-US" sz="1100" dirty="0">
-                <a:solidFill>
-                  <a:schemeClr val="dk1"/>
-                </a:solidFill>
-                <a:latin typeface="Century Gothic"/>
-                <a:ea typeface="Century Gothic"/>
-                <a:cs typeface="Century Gothic"/>
-                <a:sym typeface="Century Gothic"/>
-              </a:rPr>
-              <a:t> and </a:t>
-            </a:r>
-            <a:r>
-              <a:rPr lang="en-US" sz="1100" b="1" dirty="0">
-                <a:solidFill>
-                  <a:schemeClr val="dk1"/>
-                </a:solidFill>
-                <a:latin typeface="Century Gothic"/>
-                <a:ea typeface="Century Gothic"/>
-                <a:cs typeface="Century Gothic"/>
-                <a:sym typeface="Century Gothic"/>
-              </a:rPr>
-              <a:t>JOB</a:t>
-            </a:r>
-            <a:r>
-              <a:rPr lang="en-US" sz="1100" dirty="0">
-                <a:solidFill>
-                  <a:schemeClr val="dk1"/>
-                </a:solidFill>
-                <a:latin typeface="Century Gothic"/>
-                <a:ea typeface="Century Gothic"/>
-                <a:cs typeface="Century Gothic"/>
-                <a:sym typeface="Century Gothic"/>
-              </a:rPr>
-              <a:t> will need encoding</a:t>
-            </a:r>
-          </a:p>
-          <a:p>
-            <a:pPr marL="139700" lvl="0" indent="0" algn="just">
-              <a:spcBef>
-                <a:spcPts val="600"/>
-              </a:spcBef>
-              <a:buClr>
-                <a:schemeClr val="dk1"/>
-              </a:buClr>
-              <a:buSzPts val="1400"/>
-              <a:buNone/>
-            </a:pPr>
-            <a:r>
-              <a:rPr lang="en-US" sz="1100" b="1" dirty="0">
-                <a:solidFill>
-                  <a:schemeClr val="dk1"/>
-                </a:solidFill>
-                <a:latin typeface="Century Gothic"/>
-                <a:ea typeface="Century Gothic"/>
-                <a:cs typeface="Century Gothic"/>
-                <a:sym typeface="Century Gothic"/>
-              </a:rPr>
-              <a:t>DEBTINC most incomplete</a:t>
-            </a:r>
-            <a:r>
-              <a:rPr lang="en-US" sz="1100" dirty="0">
-                <a:solidFill>
-                  <a:schemeClr val="dk1"/>
-                </a:solidFill>
-                <a:latin typeface="Century Gothic"/>
-                <a:ea typeface="Century Gothic"/>
-                <a:cs typeface="Century Gothic"/>
-                <a:sym typeface="Century Gothic"/>
-              </a:rPr>
-              <a:t> — Only 4,693 records; key feature for loan risk so imputation strategy matters</a:t>
-            </a:r>
-            <a:endParaRPr sz="1100" dirty="0">
-              <a:solidFill>
-                <a:schemeClr val="dk1"/>
-              </a:solidFill>
-              <a:latin typeface="Century Gothic"/>
-              <a:ea typeface="Century Gothic"/>
-              <a:cs typeface="Century Gothic"/>
-              <a:sym typeface="Century Gothic"/>
-            </a:endParaRPr>
           </a:p>
         </p:txBody>
       </p:sp>
@@ -34153,10 +34658,10 @@
       </p:sp>
       <p:pic>
         <p:nvPicPr>
-          <p:cNvPr id="4" name="Picture 3" descr="A table with numbers and text&#10;&#10;AI-generated content may be incorrect.">
+          <p:cNvPr id="5" name="Picture 4">
             <a:extLst>
               <a:ext uri="{FF2B5EF4-FFF2-40B4-BE49-F238E27FC236}">
-                <a16:creationId xmlns:a16="http://schemas.microsoft.com/office/drawing/2014/main" id="{588FAFCB-0529-4A50-A39C-A8C94109A17F}"/>
+                <a16:creationId xmlns:a16="http://schemas.microsoft.com/office/drawing/2014/main" id="{6FE395B2-C708-472F-003E-07580DB8B803}"/>
               </a:ext>
             </a:extLst>
           </p:cNvPr>
@@ -34173,8 +34678,98 @@
         </p:blipFill>
         <p:spPr>
           <a:xfrm>
-            <a:off x="190263" y="555114"/>
-            <a:ext cx="8520600" cy="2494298"/>
+            <a:off x="339152" y="771424"/>
+            <a:ext cx="8520601" cy="1046277"/>
+          </a:xfrm>
+          <a:prstGeom prst="rect">
+            <a:avLst/>
+          </a:prstGeom>
+        </p:spPr>
+      </p:pic>
+      <p:pic>
+        <p:nvPicPr>
+          <p:cNvPr id="7" name="Picture 6">
+            <a:extLst>
+              <a:ext uri="{FF2B5EF4-FFF2-40B4-BE49-F238E27FC236}">
+                <a16:creationId xmlns:a16="http://schemas.microsoft.com/office/drawing/2014/main" id="{831AB17F-A32F-25E9-1FB6-0BC97694828F}"/>
+              </a:ext>
+            </a:extLst>
+          </p:cNvPr>
+          <p:cNvPicPr>
+            <a:picLocks noChangeAspect="1"/>
+          </p:cNvPicPr>
+          <p:nvPr/>
+        </p:nvPicPr>
+        <p:blipFill>
+          <a:blip r:embed="rId4"/>
+          <a:stretch>
+            <a:fillRect/>
+          </a:stretch>
+        </p:blipFill>
+        <p:spPr>
+          <a:xfrm>
+            <a:off x="359777" y="1974599"/>
+            <a:ext cx="3277388" cy="1194302"/>
+          </a:xfrm>
+          <a:prstGeom prst="rect">
+            <a:avLst/>
+          </a:prstGeom>
+        </p:spPr>
+      </p:pic>
+      <p:pic>
+        <p:nvPicPr>
+          <p:cNvPr id="11" name="Picture 10">
+            <a:extLst>
+              <a:ext uri="{FF2B5EF4-FFF2-40B4-BE49-F238E27FC236}">
+                <a16:creationId xmlns:a16="http://schemas.microsoft.com/office/drawing/2014/main" id="{375A91B1-5549-02A6-3238-4F7FC39A712F}"/>
+              </a:ext>
+            </a:extLst>
+          </p:cNvPr>
+          <p:cNvPicPr>
+            <a:picLocks noChangeAspect="1"/>
+          </p:cNvPicPr>
+          <p:nvPr/>
+        </p:nvPicPr>
+        <p:blipFill>
+          <a:blip r:embed="rId5"/>
+          <a:stretch>
+            <a:fillRect/>
+          </a:stretch>
+        </p:blipFill>
+        <p:spPr>
+          <a:xfrm>
+            <a:off x="4815871" y="1995393"/>
+            <a:ext cx="2941471" cy="591463"/>
+          </a:xfrm>
+          <a:prstGeom prst="rect">
+            <a:avLst/>
+          </a:prstGeom>
+        </p:spPr>
+      </p:pic>
+      <p:pic>
+        <p:nvPicPr>
+          <p:cNvPr id="13" name="Picture 12">
+            <a:extLst>
+              <a:ext uri="{FF2B5EF4-FFF2-40B4-BE49-F238E27FC236}">
+                <a16:creationId xmlns:a16="http://schemas.microsoft.com/office/drawing/2014/main" id="{0D0EDA72-A858-892C-A9D8-50C9E370532F}"/>
+              </a:ext>
+            </a:extLst>
+          </p:cNvPr>
+          <p:cNvPicPr>
+            <a:picLocks noChangeAspect="1"/>
+          </p:cNvPicPr>
+          <p:nvPr/>
+        </p:nvPicPr>
+        <p:blipFill>
+          <a:blip r:embed="rId6"/>
+          <a:stretch>
+            <a:fillRect/>
+          </a:stretch>
+        </p:blipFill>
+        <p:spPr>
+          <a:xfrm>
+            <a:off x="4047498" y="2676231"/>
+            <a:ext cx="4478218" cy="591463"/>
           </a:xfrm>
           <a:prstGeom prst="rect">
             <a:avLst/>

</xml_diff>